<commit_message>
Add Kokkos "hello world"
</commit_message>
<xml_diff>
--- a/gpu_programming.pptx
+++ b/gpu_programming.pptx
@@ -1,9 +1,12 @@
 
 <file path=ppt/presentation.xml><?xml version="1.0" encoding="utf-8"?>
-<p:presentation xmlns:a="http://schemas.openxmlformats.org/drawingml/2006/main" xmlns:r="http://schemas.openxmlformats.org/officeDocument/2006/relationships" xmlns:p="http://schemas.openxmlformats.org/presentationml/2006/main" saveSubsetFonts="1">
+<p:presentation xmlns:a="http://schemas.openxmlformats.org/drawingml/2006/main" xmlns:r="http://schemas.openxmlformats.org/officeDocument/2006/relationships" xmlns:p="http://schemas.openxmlformats.org/presentationml/2006/main" showSpecialPlsOnTitleSld="0" saveSubsetFonts="1">
   <p:sldMasterIdLst>
     <p:sldMasterId id="2147483648" r:id="rId1"/>
   </p:sldMasterIdLst>
+  <p:notesMasterIdLst>
+    <p:notesMasterId r:id="rId13"/>
+  </p:notesMasterIdLst>
   <p:sldIdLst>
     <p:sldId id="256" r:id="rId2"/>
     <p:sldId id="357" r:id="rId3"/>
@@ -15,6 +18,7 @@
     <p:sldId id="362" r:id="rId9"/>
     <p:sldId id="364" r:id="rId10"/>
     <p:sldId id="363" r:id="rId11"/>
+    <p:sldId id="365" r:id="rId12"/>
   </p:sldIdLst>
   <p:sldSz cx="12192000" cy="6858000"/>
   <p:notesSz cx="6858000" cy="9144000"/>
@@ -113,7 +117,361 @@
       </a:defRPr>
     </a:lvl9pPr>
   </p:defaultTextStyle>
+  <p:extLst>
+    <p:ext uri="{EFAFB233-063F-42B5-8137-9DF3F51BA10A}">
+      <p15:sldGuideLst xmlns:p15="http://schemas.microsoft.com/office/powerpoint/2012/main"/>
+    </p:ext>
+  </p:extLst>
 </p:presentation>
+</file>
+
+<file path=ppt/notesMasters/notesMaster1.xml><?xml version="1.0" encoding="utf-8"?>
+<p:notesMaster xmlns:a="http://schemas.openxmlformats.org/drawingml/2006/main" xmlns:r="http://schemas.openxmlformats.org/officeDocument/2006/relationships" xmlns:p="http://schemas.openxmlformats.org/presentationml/2006/main">
+  <p:cSld>
+    <p:bg>
+      <p:bgRef idx="1001">
+        <a:schemeClr val="bg1"/>
+      </p:bgRef>
+    </p:bg>
+    <p:spTree>
+      <p:nvGrpSpPr>
+        <p:cNvPr id="1" name=""/>
+        <p:cNvGrpSpPr/>
+        <p:nvPr/>
+      </p:nvGrpSpPr>
+      <p:grpSpPr>
+        <a:xfrm>
+          <a:off x="0" y="0"/>
+          <a:ext cx="0" cy="0"/>
+          <a:chOff x="0" y="0"/>
+          <a:chExt cx="0" cy="0"/>
+        </a:xfrm>
+      </p:grpSpPr>
+      <p:sp>
+        <p:nvSpPr>
+          <p:cNvPr id="2" name="Header Placeholder 1"/>
+          <p:cNvSpPr>
+            <a:spLocks noGrp="1"/>
+          </p:cNvSpPr>
+          <p:nvPr>
+            <p:ph type="hdr" sz="quarter"/>
+          </p:nvPr>
+        </p:nvSpPr>
+        <p:spPr>
+          <a:xfrm>
+            <a:off x="0" y="0"/>
+            <a:ext cx="2971800" cy="458788"/>
+          </a:xfrm>
+          <a:prstGeom prst="rect">
+            <a:avLst/>
+          </a:prstGeom>
+        </p:spPr>
+        <p:txBody>
+          <a:bodyPr vert="horz" lIns="91440" tIns="45720" rIns="91440" bIns="45720" rtlCol="0"/>
+          <a:lstStyle>
+            <a:lvl1pPr algn="l">
+              <a:defRPr sz="1200"/>
+            </a:lvl1pPr>
+          </a:lstStyle>
+          <a:p>
+            <a:endParaRPr lang="en-US"/>
+          </a:p>
+        </p:txBody>
+      </p:sp>
+      <p:sp>
+        <p:nvSpPr>
+          <p:cNvPr id="3" name="Date Placeholder 2"/>
+          <p:cNvSpPr>
+            <a:spLocks noGrp="1"/>
+          </p:cNvSpPr>
+          <p:nvPr>
+            <p:ph type="dt" idx="1"/>
+          </p:nvPr>
+        </p:nvSpPr>
+        <p:spPr>
+          <a:xfrm>
+            <a:off x="3884613" y="0"/>
+            <a:ext cx="2971800" cy="458788"/>
+          </a:xfrm>
+          <a:prstGeom prst="rect">
+            <a:avLst/>
+          </a:prstGeom>
+        </p:spPr>
+        <p:txBody>
+          <a:bodyPr vert="horz" lIns="91440" tIns="45720" rIns="91440" bIns="45720" rtlCol="0"/>
+          <a:lstStyle>
+            <a:lvl1pPr algn="r">
+              <a:defRPr sz="1200"/>
+            </a:lvl1pPr>
+          </a:lstStyle>
+          <a:p>
+            <a:fld id="{F6C923FB-61FA-4287-9241-F85679197DAB}" type="datetimeFigureOut">
+              <a:rPr lang="en-US" smtClean="0"/>
+              <a:t>2024-07-30</a:t>
+            </a:fld>
+            <a:endParaRPr lang="en-US"/>
+          </a:p>
+        </p:txBody>
+      </p:sp>
+      <p:sp>
+        <p:nvSpPr>
+          <p:cNvPr id="4" name="Slide Image Placeholder 3"/>
+          <p:cNvSpPr>
+            <a:spLocks noGrp="1" noRot="1" noChangeAspect="1"/>
+          </p:cNvSpPr>
+          <p:nvPr>
+            <p:ph type="sldImg" idx="2"/>
+          </p:nvPr>
+        </p:nvSpPr>
+        <p:spPr>
+          <a:xfrm>
+            <a:off x="685800" y="1143000"/>
+            <a:ext cx="5486400" cy="3086100"/>
+          </a:xfrm>
+          <a:prstGeom prst="rect">
+            <a:avLst/>
+          </a:prstGeom>
+          <a:noFill/>
+          <a:ln w="12700">
+            <a:solidFill>
+              <a:prstClr val="black"/>
+            </a:solidFill>
+          </a:ln>
+        </p:spPr>
+        <p:txBody>
+          <a:bodyPr vert="horz" lIns="91440" tIns="45720" rIns="91440" bIns="45720" rtlCol="0" anchor="ctr"/>
+          <a:lstStyle/>
+          <a:p>
+            <a:endParaRPr lang="en-US"/>
+          </a:p>
+        </p:txBody>
+      </p:sp>
+      <p:sp>
+        <p:nvSpPr>
+          <p:cNvPr id="5" name="Notes Placeholder 4"/>
+          <p:cNvSpPr>
+            <a:spLocks noGrp="1"/>
+          </p:cNvSpPr>
+          <p:nvPr>
+            <p:ph type="body" sz="quarter" idx="3"/>
+          </p:nvPr>
+        </p:nvSpPr>
+        <p:spPr>
+          <a:xfrm>
+            <a:off x="685800" y="4400550"/>
+            <a:ext cx="5486400" cy="3600450"/>
+          </a:xfrm>
+          <a:prstGeom prst="rect">
+            <a:avLst/>
+          </a:prstGeom>
+        </p:spPr>
+        <p:txBody>
+          <a:bodyPr vert="horz" lIns="91440" tIns="45720" rIns="91440" bIns="45720" rtlCol="0"/>
+          <a:lstStyle/>
+          <a:p>
+            <a:pPr lvl="0"/>
+            <a:r>
+              <a:rPr lang="en-US"/>
+              <a:t>Click to edit Master text styles</a:t>
+            </a:r>
+          </a:p>
+          <a:p>
+            <a:pPr lvl="1"/>
+            <a:r>
+              <a:rPr lang="en-US"/>
+              <a:t>Second level</a:t>
+            </a:r>
+          </a:p>
+          <a:p>
+            <a:pPr lvl="2"/>
+            <a:r>
+              <a:rPr lang="en-US"/>
+              <a:t>Third level</a:t>
+            </a:r>
+          </a:p>
+          <a:p>
+            <a:pPr lvl="3"/>
+            <a:r>
+              <a:rPr lang="en-US"/>
+              <a:t>Fourth level</a:t>
+            </a:r>
+          </a:p>
+          <a:p>
+            <a:pPr lvl="4"/>
+            <a:r>
+              <a:rPr lang="en-US"/>
+              <a:t>Fifth level</a:t>
+            </a:r>
+          </a:p>
+        </p:txBody>
+      </p:sp>
+      <p:sp>
+        <p:nvSpPr>
+          <p:cNvPr id="6" name="Footer Placeholder 5"/>
+          <p:cNvSpPr>
+            <a:spLocks noGrp="1"/>
+          </p:cNvSpPr>
+          <p:nvPr>
+            <p:ph type="ftr" sz="quarter" idx="4"/>
+          </p:nvPr>
+        </p:nvSpPr>
+        <p:spPr>
+          <a:xfrm>
+            <a:off x="0" y="8685213"/>
+            <a:ext cx="2971800" cy="458787"/>
+          </a:xfrm>
+          <a:prstGeom prst="rect">
+            <a:avLst/>
+          </a:prstGeom>
+        </p:spPr>
+        <p:txBody>
+          <a:bodyPr vert="horz" lIns="91440" tIns="45720" rIns="91440" bIns="45720" rtlCol="0" anchor="b"/>
+          <a:lstStyle>
+            <a:lvl1pPr algn="l">
+              <a:defRPr sz="1200"/>
+            </a:lvl1pPr>
+          </a:lstStyle>
+          <a:p>
+            <a:endParaRPr lang="en-US"/>
+          </a:p>
+        </p:txBody>
+      </p:sp>
+      <p:sp>
+        <p:nvSpPr>
+          <p:cNvPr id="7" name="Slide Number Placeholder 6"/>
+          <p:cNvSpPr>
+            <a:spLocks noGrp="1"/>
+          </p:cNvSpPr>
+          <p:nvPr>
+            <p:ph type="sldNum" sz="quarter" idx="5"/>
+          </p:nvPr>
+        </p:nvSpPr>
+        <p:spPr>
+          <a:xfrm>
+            <a:off x="3884613" y="8685213"/>
+            <a:ext cx="2971800" cy="458787"/>
+          </a:xfrm>
+          <a:prstGeom prst="rect">
+            <a:avLst/>
+          </a:prstGeom>
+        </p:spPr>
+        <p:txBody>
+          <a:bodyPr vert="horz" lIns="91440" tIns="45720" rIns="91440" bIns="45720" rtlCol="0" anchor="b"/>
+          <a:lstStyle>
+            <a:lvl1pPr algn="r">
+              <a:defRPr sz="1200"/>
+            </a:lvl1pPr>
+          </a:lstStyle>
+          <a:p>
+            <a:fld id="{E92C95E8-30B8-48C5-BC51-D81C93F02B3C}" type="slidenum">
+              <a:rPr lang="en-US" smtClean="0"/>
+              <a:t>‹#›</a:t>
+            </a:fld>
+            <a:endParaRPr lang="en-US"/>
+          </a:p>
+        </p:txBody>
+      </p:sp>
+    </p:spTree>
+    <p:extLst>
+      <p:ext uri="{BB962C8B-B14F-4D97-AF65-F5344CB8AC3E}">
+        <p14:creationId xmlns:p14="http://schemas.microsoft.com/office/powerpoint/2010/main" val="312000797"/>
+      </p:ext>
+    </p:extLst>
+  </p:cSld>
+  <p:clrMap bg1="lt1" tx1="dk1" bg2="lt2" tx2="dk2" accent1="accent1" accent2="accent2" accent3="accent3" accent4="accent4" accent5="accent5" accent6="accent6" hlink="hlink" folHlink="folHlink"/>
+  <p:notesStyle>
+    <a:lvl1pPr marL="0" algn="l" defTabSz="914400" rtl="0" eaLnBrk="1" latinLnBrk="0" hangingPunct="1">
+      <a:defRPr sz="1200" kern="1200">
+        <a:solidFill>
+          <a:schemeClr val="tx1"/>
+        </a:solidFill>
+        <a:latin typeface="+mn-lt"/>
+        <a:ea typeface="+mn-ea"/>
+        <a:cs typeface="+mn-cs"/>
+      </a:defRPr>
+    </a:lvl1pPr>
+    <a:lvl2pPr marL="457200" algn="l" defTabSz="914400" rtl="0" eaLnBrk="1" latinLnBrk="0" hangingPunct="1">
+      <a:defRPr sz="1200" kern="1200">
+        <a:solidFill>
+          <a:schemeClr val="tx1"/>
+        </a:solidFill>
+        <a:latin typeface="+mn-lt"/>
+        <a:ea typeface="+mn-ea"/>
+        <a:cs typeface="+mn-cs"/>
+      </a:defRPr>
+    </a:lvl2pPr>
+    <a:lvl3pPr marL="914400" algn="l" defTabSz="914400" rtl="0" eaLnBrk="1" latinLnBrk="0" hangingPunct="1">
+      <a:defRPr sz="1200" kern="1200">
+        <a:solidFill>
+          <a:schemeClr val="tx1"/>
+        </a:solidFill>
+        <a:latin typeface="+mn-lt"/>
+        <a:ea typeface="+mn-ea"/>
+        <a:cs typeface="+mn-cs"/>
+      </a:defRPr>
+    </a:lvl3pPr>
+    <a:lvl4pPr marL="1371600" algn="l" defTabSz="914400" rtl="0" eaLnBrk="1" latinLnBrk="0" hangingPunct="1">
+      <a:defRPr sz="1200" kern="1200">
+        <a:solidFill>
+          <a:schemeClr val="tx1"/>
+        </a:solidFill>
+        <a:latin typeface="+mn-lt"/>
+        <a:ea typeface="+mn-ea"/>
+        <a:cs typeface="+mn-cs"/>
+      </a:defRPr>
+    </a:lvl4pPr>
+    <a:lvl5pPr marL="1828800" algn="l" defTabSz="914400" rtl="0" eaLnBrk="1" latinLnBrk="0" hangingPunct="1">
+      <a:defRPr sz="1200" kern="1200">
+        <a:solidFill>
+          <a:schemeClr val="tx1"/>
+        </a:solidFill>
+        <a:latin typeface="+mn-lt"/>
+        <a:ea typeface="+mn-ea"/>
+        <a:cs typeface="+mn-cs"/>
+      </a:defRPr>
+    </a:lvl5pPr>
+    <a:lvl6pPr marL="2286000" algn="l" defTabSz="914400" rtl="0" eaLnBrk="1" latinLnBrk="0" hangingPunct="1">
+      <a:defRPr sz="1200" kern="1200">
+        <a:solidFill>
+          <a:schemeClr val="tx1"/>
+        </a:solidFill>
+        <a:latin typeface="+mn-lt"/>
+        <a:ea typeface="+mn-ea"/>
+        <a:cs typeface="+mn-cs"/>
+      </a:defRPr>
+    </a:lvl6pPr>
+    <a:lvl7pPr marL="2743200" algn="l" defTabSz="914400" rtl="0" eaLnBrk="1" latinLnBrk="0" hangingPunct="1">
+      <a:defRPr sz="1200" kern="1200">
+        <a:solidFill>
+          <a:schemeClr val="tx1"/>
+        </a:solidFill>
+        <a:latin typeface="+mn-lt"/>
+        <a:ea typeface="+mn-ea"/>
+        <a:cs typeface="+mn-cs"/>
+      </a:defRPr>
+    </a:lvl7pPr>
+    <a:lvl8pPr marL="3200400" algn="l" defTabSz="914400" rtl="0" eaLnBrk="1" latinLnBrk="0" hangingPunct="1">
+      <a:defRPr sz="1200" kern="1200">
+        <a:solidFill>
+          <a:schemeClr val="tx1"/>
+        </a:solidFill>
+        <a:latin typeface="+mn-lt"/>
+        <a:ea typeface="+mn-ea"/>
+        <a:cs typeface="+mn-cs"/>
+      </a:defRPr>
+    </a:lvl8pPr>
+    <a:lvl9pPr marL="3657600" algn="l" defTabSz="914400" rtl="0" eaLnBrk="1" latinLnBrk="0" hangingPunct="1">
+      <a:defRPr sz="1200" kern="1200">
+        <a:solidFill>
+          <a:schemeClr val="tx1"/>
+        </a:solidFill>
+        <a:latin typeface="+mn-lt"/>
+        <a:ea typeface="+mn-ea"/>
+        <a:cs typeface="+mn-cs"/>
+      </a:defRPr>
+    </a:lvl9pPr>
+  </p:notesStyle>
+</p:notesMaster>
 </file>
 
 <file path=ppt/slideLayouts/slideLayout1.xml><?xml version="1.0" encoding="utf-8"?>
@@ -263,9 +621,9 @@
           <a:bodyPr/>
           <a:lstStyle/>
           <a:p>
-            <a:fld id="{FD21321F-D833-4788-9E7B-A10A4D128284}" type="datetimeFigureOut">
+            <a:fld id="{8D62E987-8D4C-426B-A5FA-0E34158E0882}" type="datetime1">
               <a:rPr lang="LID4096" smtClean="0"/>
-              <a:t>07/29/2024</a:t>
+              <a:t>07/30/2024</a:t>
             </a:fld>
             <a:endParaRPr lang="LID4096"/>
           </a:p>
@@ -463,9 +821,9 @@
           <a:bodyPr/>
           <a:lstStyle/>
           <a:p>
-            <a:fld id="{FD21321F-D833-4788-9E7B-A10A4D128284}" type="datetimeFigureOut">
+            <a:fld id="{FAEDB9EE-F760-4CB0-8B69-80528298500B}" type="datetime1">
               <a:rPr lang="LID4096" smtClean="0"/>
-              <a:t>07/29/2024</a:t>
+              <a:t>07/30/2024</a:t>
             </a:fld>
             <a:endParaRPr lang="LID4096"/>
           </a:p>
@@ -673,9 +1031,9 @@
           <a:bodyPr/>
           <a:lstStyle/>
           <a:p>
-            <a:fld id="{FD21321F-D833-4788-9E7B-A10A4D128284}" type="datetimeFigureOut">
+            <a:fld id="{80747FB6-4DF5-4E64-8740-20980B1F9232}" type="datetime1">
               <a:rPr lang="LID4096" smtClean="0"/>
-              <a:t>07/29/2024</a:t>
+              <a:t>07/30/2024</a:t>
             </a:fld>
             <a:endParaRPr lang="LID4096"/>
           </a:p>
@@ -873,9 +1231,9 @@
           <a:bodyPr/>
           <a:lstStyle/>
           <a:p>
-            <a:fld id="{FD21321F-D833-4788-9E7B-A10A4D128284}" type="datetimeFigureOut">
+            <a:fld id="{EB59AC84-95C7-43B3-BAB8-87738A262CEF}" type="datetime1">
               <a:rPr lang="LID4096" smtClean="0"/>
-              <a:t>07/29/2024</a:t>
+              <a:t>07/30/2024</a:t>
             </a:fld>
             <a:endParaRPr lang="LID4096"/>
           </a:p>
@@ -1149,9 +1507,9 @@
           <a:bodyPr/>
           <a:lstStyle/>
           <a:p>
-            <a:fld id="{FD21321F-D833-4788-9E7B-A10A4D128284}" type="datetimeFigureOut">
+            <a:fld id="{DF8CEAD6-2CBC-401C-BDAF-9A7A4115C2E9}" type="datetime1">
               <a:rPr lang="LID4096" smtClean="0"/>
-              <a:t>07/29/2024</a:t>
+              <a:t>07/30/2024</a:t>
             </a:fld>
             <a:endParaRPr lang="LID4096"/>
           </a:p>
@@ -1417,9 +1775,9 @@
           <a:bodyPr/>
           <a:lstStyle/>
           <a:p>
-            <a:fld id="{FD21321F-D833-4788-9E7B-A10A4D128284}" type="datetimeFigureOut">
+            <a:fld id="{5A937559-5866-4203-A3AB-9E4FD843970C}" type="datetime1">
               <a:rPr lang="LID4096" smtClean="0"/>
-              <a:t>07/29/2024</a:t>
+              <a:t>07/30/2024</a:t>
             </a:fld>
             <a:endParaRPr lang="LID4096"/>
           </a:p>
@@ -1832,9 +2190,9 @@
           <a:bodyPr/>
           <a:lstStyle/>
           <a:p>
-            <a:fld id="{FD21321F-D833-4788-9E7B-A10A4D128284}" type="datetimeFigureOut">
+            <a:fld id="{05A23F01-A9A7-477C-8130-4F9F17D6277B}" type="datetime1">
               <a:rPr lang="LID4096" smtClean="0"/>
-              <a:t>07/29/2024</a:t>
+              <a:t>07/30/2024</a:t>
             </a:fld>
             <a:endParaRPr lang="LID4096"/>
           </a:p>
@@ -1974,9 +2332,9 @@
           <a:bodyPr/>
           <a:lstStyle/>
           <a:p>
-            <a:fld id="{FD21321F-D833-4788-9E7B-A10A4D128284}" type="datetimeFigureOut">
+            <a:fld id="{E67C1760-580E-4B97-BECA-F5A5C853B733}" type="datetime1">
               <a:rPr lang="LID4096" smtClean="0"/>
-              <a:t>07/29/2024</a:t>
+              <a:t>07/30/2024</a:t>
             </a:fld>
             <a:endParaRPr lang="LID4096"/>
           </a:p>
@@ -2087,9 +2445,9 @@
           <a:bodyPr/>
           <a:lstStyle/>
           <a:p>
-            <a:fld id="{FD21321F-D833-4788-9E7B-A10A4D128284}" type="datetimeFigureOut">
+            <a:fld id="{170CCDC7-902B-4A40-BD8B-DFBE3537F2A1}" type="datetime1">
               <a:rPr lang="LID4096" smtClean="0"/>
-              <a:t>07/29/2024</a:t>
+              <a:t>07/30/2024</a:t>
             </a:fld>
             <a:endParaRPr lang="LID4096"/>
           </a:p>
@@ -2400,9 +2758,9 @@
           <a:bodyPr/>
           <a:lstStyle/>
           <a:p>
-            <a:fld id="{FD21321F-D833-4788-9E7B-A10A4D128284}" type="datetimeFigureOut">
+            <a:fld id="{FCCD66CE-F2DD-4E26-A077-706FCF2A6CD1}" type="datetime1">
               <a:rPr lang="LID4096" smtClean="0"/>
-              <a:t>07/29/2024</a:t>
+              <a:t>07/30/2024</a:t>
             </a:fld>
             <a:endParaRPr lang="LID4096"/>
           </a:p>
@@ -2689,9 +3047,9 @@
           <a:bodyPr/>
           <a:lstStyle/>
           <a:p>
-            <a:fld id="{FD21321F-D833-4788-9E7B-A10A4D128284}" type="datetimeFigureOut">
+            <a:fld id="{FCBCD0B1-D2B3-4FFE-9D02-44780247580A}" type="datetime1">
               <a:rPr lang="LID4096" smtClean="0"/>
-              <a:t>07/29/2024</a:t>
+              <a:t>07/30/2024</a:t>
             </a:fld>
             <a:endParaRPr lang="LID4096"/>
           </a:p>
@@ -2932,9 +3290,9 @@
             </a:lvl1pPr>
           </a:lstStyle>
           <a:p>
-            <a:fld id="{FD21321F-D833-4788-9E7B-A10A4D128284}" type="datetimeFigureOut">
+            <a:fld id="{3A352FED-6D85-4474-88CC-1E736BE8F303}" type="datetime1">
               <a:rPr lang="LID4096" smtClean="0"/>
-              <a:t>07/29/2024</a:t>
+              <a:t>07/30/2024</a:t>
             </a:fld>
             <a:endParaRPr lang="LID4096"/>
           </a:p>
@@ -3051,6 +3409,7 @@
     <p:sldLayoutId id="2147483658" r:id="rId10"/>
     <p:sldLayoutId id="2147483659" r:id="rId11"/>
   </p:sldLayoutIdLst>
+  <p:hf hdr="0" ftr="0" dt="0"/>
   <p:txStyles>
     <p:titleStyle>
       <a:lvl1pPr algn="l" defTabSz="914400" rtl="0" eaLnBrk="1" latinLnBrk="0" hangingPunct="1">
@@ -3728,7 +4087,7 @@
             </a:r>
             <a:r>
               <a:rPr lang="en-US" dirty="0" err="1"/>
-              <a:t>MDrangePolicy</a:t>
+              <a:t>MDRangePolicy</a:t>
             </a:r>
             <a:endParaRPr lang="en-US" dirty="0"/>
           </a:p>
@@ -3750,6 +4109,35 @@
           </a:p>
           <a:p>
             <a:endParaRPr lang="LID4096" dirty="0"/>
+          </a:p>
+        </p:txBody>
+      </p:sp>
+      <p:sp>
+        <p:nvSpPr>
+          <p:cNvPr id="4" name="Slide Number Placeholder 3">
+            <a:extLst>
+              <a:ext uri="{FF2B5EF4-FFF2-40B4-BE49-F238E27FC236}">
+                <a16:creationId xmlns:a16="http://schemas.microsoft.com/office/drawing/2014/main" id="{BE35AED1-475A-10D4-83C7-4C06964679F7}"/>
+              </a:ext>
+            </a:extLst>
+          </p:cNvPr>
+          <p:cNvSpPr>
+            <a:spLocks noGrp="1"/>
+          </p:cNvSpPr>
+          <p:nvPr>
+            <p:ph type="sldNum" sz="quarter" idx="12"/>
+          </p:nvPr>
+        </p:nvSpPr>
+        <p:spPr/>
+        <p:txBody>
+          <a:bodyPr/>
+          <a:lstStyle/>
+          <a:p>
+            <a:fld id="{8FE49E37-3F56-4533-A4C2-6E22C2CD2E23}" type="slidenum">
+              <a:rPr lang="LID4096" smtClean="0"/>
+              <a:t>10</a:t>
+            </a:fld>
+            <a:endParaRPr lang="LID4096"/>
           </a:p>
         </p:txBody>
       </p:sp>
@@ -3757,6 +4145,1305 @@
     <p:extLst>
       <p:ext uri="{BB962C8B-B14F-4D97-AF65-F5344CB8AC3E}">
         <p14:creationId xmlns:p14="http://schemas.microsoft.com/office/powerpoint/2010/main" val="2382636800"/>
+      </p:ext>
+    </p:extLst>
+  </p:cSld>
+  <p:clrMapOvr>
+    <a:masterClrMapping/>
+  </p:clrMapOvr>
+</p:sld>
+</file>
+
+<file path=ppt/slides/slide11.xml><?xml version="1.0" encoding="utf-8"?>
+<p:sld xmlns:a="http://schemas.openxmlformats.org/drawingml/2006/main" xmlns:r="http://schemas.openxmlformats.org/officeDocument/2006/relationships" xmlns:p="http://schemas.openxmlformats.org/presentationml/2006/main">
+  <p:cSld>
+    <p:spTree>
+      <p:nvGrpSpPr>
+        <p:cNvPr id="1" name=""/>
+        <p:cNvGrpSpPr/>
+        <p:nvPr/>
+      </p:nvGrpSpPr>
+      <p:grpSpPr>
+        <a:xfrm>
+          <a:off x="0" y="0"/>
+          <a:ext cx="0" cy="0"/>
+          <a:chOff x="0" y="0"/>
+          <a:chExt cx="0" cy="0"/>
+        </a:xfrm>
+      </p:grpSpPr>
+      <p:sp>
+        <p:nvSpPr>
+          <p:cNvPr id="2" name="Title 1">
+            <a:extLst>
+              <a:ext uri="{FF2B5EF4-FFF2-40B4-BE49-F238E27FC236}">
+                <a16:creationId xmlns:a16="http://schemas.microsoft.com/office/drawing/2014/main" id="{583E1781-42F9-B707-080D-3152D83BC7B7}"/>
+              </a:ext>
+            </a:extLst>
+          </p:cNvPr>
+          <p:cNvSpPr>
+            <a:spLocks noGrp="1"/>
+          </p:cNvSpPr>
+          <p:nvPr>
+            <p:ph type="title"/>
+          </p:nvPr>
+        </p:nvSpPr>
+        <p:spPr/>
+        <p:txBody>
+          <a:bodyPr/>
+          <a:lstStyle/>
+          <a:p>
+            <a:r>
+              <a:rPr lang="en-US" dirty="0"/>
+              <a:t>Hello world</a:t>
+            </a:r>
+          </a:p>
+        </p:txBody>
+      </p:sp>
+      <p:sp>
+        <p:nvSpPr>
+          <p:cNvPr id="4" name="TextBox 3">
+            <a:extLst>
+              <a:ext uri="{FF2B5EF4-FFF2-40B4-BE49-F238E27FC236}">
+                <a16:creationId xmlns:a16="http://schemas.microsoft.com/office/drawing/2014/main" id="{94F4F644-513E-C4EE-EF93-B572DD3A80B7}"/>
+              </a:ext>
+            </a:extLst>
+          </p:cNvPr>
+          <p:cNvSpPr txBox="1"/>
+          <p:nvPr/>
+        </p:nvSpPr>
+        <p:spPr>
+          <a:xfrm>
+            <a:off x="838200" y="1408176"/>
+            <a:ext cx="7994496" cy="4524315"/>
+          </a:xfrm>
+          <a:prstGeom prst="rect">
+            <a:avLst/>
+          </a:prstGeom>
+          <a:solidFill>
+            <a:schemeClr val="bg1">
+              <a:lumMod val="95000"/>
+            </a:schemeClr>
+          </a:solidFill>
+          <a:ln>
+            <a:solidFill>
+              <a:schemeClr val="tx1"/>
+            </a:solidFill>
+          </a:ln>
+        </p:spPr>
+        <p:txBody>
+          <a:bodyPr wrap="none" rtlCol="0">
+            <a:spAutoFit/>
+          </a:bodyPr>
+          <a:lstStyle/>
+          <a:p>
+            <a:r>
+              <a:rPr lang="en-US" dirty="0">
+                <a:latin typeface="Cascadia Code" panose="020B0609020000020004" pitchFamily="49" charset="0"/>
+                <a:ea typeface="Cascadia Code" panose="020B0609020000020004" pitchFamily="49" charset="0"/>
+                <a:cs typeface="Cascadia Code" panose="020B0609020000020004" pitchFamily="49" charset="0"/>
+              </a:rPr>
+              <a:t>#include &lt;Kokkos_Core.hpp&gt;</a:t>
+            </a:r>
+          </a:p>
+          <a:p>
+            <a:r>
+              <a:rPr lang="en-US" dirty="0">
+                <a:latin typeface="Cascadia Code" panose="020B0609020000020004" pitchFamily="49" charset="0"/>
+                <a:ea typeface="Cascadia Code" panose="020B0609020000020004" pitchFamily="49" charset="0"/>
+                <a:cs typeface="Cascadia Code" panose="020B0609020000020004" pitchFamily="49" charset="0"/>
+              </a:rPr>
+              <a:t>#include &lt;iostream&gt;</a:t>
+            </a:r>
+          </a:p>
+          <a:p>
+            <a:endParaRPr lang="en-US" dirty="0">
+              <a:latin typeface="Cascadia Code" panose="020B0609020000020004" pitchFamily="49" charset="0"/>
+              <a:ea typeface="Cascadia Code" panose="020B0609020000020004" pitchFamily="49" charset="0"/>
+              <a:cs typeface="Cascadia Code" panose="020B0609020000020004" pitchFamily="49" charset="0"/>
+            </a:endParaRPr>
+          </a:p>
+          <a:p>
+            <a:r>
+              <a:rPr lang="en-US" dirty="0">
+                <a:latin typeface="Cascadia Code" panose="020B0609020000020004" pitchFamily="49" charset="0"/>
+                <a:ea typeface="Cascadia Code" panose="020B0609020000020004" pitchFamily="49" charset="0"/>
+                <a:cs typeface="Cascadia Code" panose="020B0609020000020004" pitchFamily="49" charset="0"/>
+              </a:rPr>
+              <a:t>struct </a:t>
+            </a:r>
+            <a:r>
+              <a:rPr lang="en-US" dirty="0" err="1">
+                <a:latin typeface="Cascadia Code" panose="020B0609020000020004" pitchFamily="49" charset="0"/>
+                <a:ea typeface="Cascadia Code" panose="020B0609020000020004" pitchFamily="49" charset="0"/>
+                <a:cs typeface="Cascadia Code" panose="020B0609020000020004" pitchFamily="49" charset="0"/>
+              </a:rPr>
+              <a:t>hello_world</a:t>
+            </a:r>
+            <a:r>
+              <a:rPr lang="en-US" dirty="0">
+                <a:latin typeface="Cascadia Code" panose="020B0609020000020004" pitchFamily="49" charset="0"/>
+                <a:ea typeface="Cascadia Code" panose="020B0609020000020004" pitchFamily="49" charset="0"/>
+                <a:cs typeface="Cascadia Code" panose="020B0609020000020004" pitchFamily="49" charset="0"/>
+              </a:rPr>
+              <a:t> {</a:t>
+            </a:r>
+          </a:p>
+          <a:p>
+            <a:r>
+              <a:rPr lang="en-US" dirty="0">
+                <a:latin typeface="Cascadia Code" panose="020B0609020000020004" pitchFamily="49" charset="0"/>
+                <a:ea typeface="Cascadia Code" panose="020B0609020000020004" pitchFamily="49" charset="0"/>
+                <a:cs typeface="Cascadia Code" panose="020B0609020000020004" pitchFamily="49" charset="0"/>
+              </a:rPr>
+              <a:t>    KOKKOS_INLINE_FUNCTION</a:t>
+            </a:r>
+          </a:p>
+          <a:p>
+            <a:r>
+              <a:rPr lang="en-US" dirty="0">
+                <a:latin typeface="Cascadia Code" panose="020B0609020000020004" pitchFamily="49" charset="0"/>
+                <a:ea typeface="Cascadia Code" panose="020B0609020000020004" pitchFamily="49" charset="0"/>
+                <a:cs typeface="Cascadia Code" panose="020B0609020000020004" pitchFamily="49" charset="0"/>
+              </a:rPr>
+              <a:t>        void operator()(const int </a:t>
+            </a:r>
+            <a:r>
+              <a:rPr lang="en-US" dirty="0" err="1">
+                <a:latin typeface="Cascadia Code" panose="020B0609020000020004" pitchFamily="49" charset="0"/>
+                <a:ea typeface="Cascadia Code" panose="020B0609020000020004" pitchFamily="49" charset="0"/>
+                <a:cs typeface="Cascadia Code" panose="020B0609020000020004" pitchFamily="49" charset="0"/>
+              </a:rPr>
+              <a:t>i</a:t>
+            </a:r>
+            <a:r>
+              <a:rPr lang="en-US" dirty="0">
+                <a:latin typeface="Cascadia Code" panose="020B0609020000020004" pitchFamily="49" charset="0"/>
+                <a:ea typeface="Cascadia Code" panose="020B0609020000020004" pitchFamily="49" charset="0"/>
+                <a:cs typeface="Cascadia Code" panose="020B0609020000020004" pitchFamily="49" charset="0"/>
+              </a:rPr>
+              <a:t>) const {</a:t>
+            </a:r>
+          </a:p>
+          <a:p>
+            <a:r>
+              <a:rPr lang="en-US" dirty="0">
+                <a:latin typeface="Cascadia Code" panose="020B0609020000020004" pitchFamily="49" charset="0"/>
+                <a:ea typeface="Cascadia Code" panose="020B0609020000020004" pitchFamily="49" charset="0"/>
+                <a:cs typeface="Cascadia Code" panose="020B0609020000020004" pitchFamily="49" charset="0"/>
+              </a:rPr>
+              <a:t>            </a:t>
+            </a:r>
+            <a:r>
+              <a:rPr lang="en-US" dirty="0" err="1">
+                <a:latin typeface="Cascadia Code" panose="020B0609020000020004" pitchFamily="49" charset="0"/>
+                <a:ea typeface="Cascadia Code" panose="020B0609020000020004" pitchFamily="49" charset="0"/>
+                <a:cs typeface="Cascadia Code" panose="020B0609020000020004" pitchFamily="49" charset="0"/>
+              </a:rPr>
+              <a:t>Kokkos</a:t>
+            </a:r>
+            <a:r>
+              <a:rPr lang="en-US" dirty="0">
+                <a:latin typeface="Cascadia Code" panose="020B0609020000020004" pitchFamily="49" charset="0"/>
+                <a:ea typeface="Cascadia Code" panose="020B0609020000020004" pitchFamily="49" charset="0"/>
+                <a:cs typeface="Cascadia Code" panose="020B0609020000020004" pitchFamily="49" charset="0"/>
+              </a:rPr>
+              <a:t>::</a:t>
+            </a:r>
+            <a:r>
+              <a:rPr lang="en-US" dirty="0" err="1">
+                <a:latin typeface="Cascadia Code" panose="020B0609020000020004" pitchFamily="49" charset="0"/>
+                <a:ea typeface="Cascadia Code" panose="020B0609020000020004" pitchFamily="49" charset="0"/>
+                <a:cs typeface="Cascadia Code" panose="020B0609020000020004" pitchFamily="49" charset="0"/>
+              </a:rPr>
+              <a:t>printf</a:t>
+            </a:r>
+            <a:r>
+              <a:rPr lang="en-US" dirty="0">
+                <a:latin typeface="Cascadia Code" panose="020B0609020000020004" pitchFamily="49" charset="0"/>
+                <a:ea typeface="Cascadia Code" panose="020B0609020000020004" pitchFamily="49" charset="0"/>
+                <a:cs typeface="Cascadia Code" panose="020B0609020000020004" pitchFamily="49" charset="0"/>
+              </a:rPr>
+              <a:t>("Hello from </a:t>
+            </a:r>
+            <a:r>
+              <a:rPr lang="en-US" dirty="0" err="1">
+                <a:latin typeface="Cascadia Code" panose="020B0609020000020004" pitchFamily="49" charset="0"/>
+                <a:ea typeface="Cascadia Code" panose="020B0609020000020004" pitchFamily="49" charset="0"/>
+                <a:cs typeface="Cascadia Code" panose="020B0609020000020004" pitchFamily="49" charset="0"/>
+              </a:rPr>
+              <a:t>i</a:t>
+            </a:r>
+            <a:r>
+              <a:rPr lang="en-US" dirty="0">
+                <a:latin typeface="Cascadia Code" panose="020B0609020000020004" pitchFamily="49" charset="0"/>
+                <a:ea typeface="Cascadia Code" panose="020B0609020000020004" pitchFamily="49" charset="0"/>
+                <a:cs typeface="Cascadia Code" panose="020B0609020000020004" pitchFamily="49" charset="0"/>
+              </a:rPr>
+              <a:t> = %</a:t>
+            </a:r>
+            <a:r>
+              <a:rPr lang="en-US" dirty="0" err="1">
+                <a:latin typeface="Cascadia Code" panose="020B0609020000020004" pitchFamily="49" charset="0"/>
+                <a:ea typeface="Cascadia Code" panose="020B0609020000020004" pitchFamily="49" charset="0"/>
+                <a:cs typeface="Cascadia Code" panose="020B0609020000020004" pitchFamily="49" charset="0"/>
+              </a:rPr>
+              <a:t>i</a:t>
+            </a:r>
+            <a:r>
+              <a:rPr lang="en-US" dirty="0">
+                <a:latin typeface="Cascadia Code" panose="020B0609020000020004" pitchFamily="49" charset="0"/>
+                <a:ea typeface="Cascadia Code" panose="020B0609020000020004" pitchFamily="49" charset="0"/>
+                <a:cs typeface="Cascadia Code" panose="020B0609020000020004" pitchFamily="49" charset="0"/>
+              </a:rPr>
+              <a:t>\n", </a:t>
+            </a:r>
+            <a:r>
+              <a:rPr lang="en-US" dirty="0" err="1">
+                <a:latin typeface="Cascadia Code" panose="020B0609020000020004" pitchFamily="49" charset="0"/>
+                <a:ea typeface="Cascadia Code" panose="020B0609020000020004" pitchFamily="49" charset="0"/>
+                <a:cs typeface="Cascadia Code" panose="020B0609020000020004" pitchFamily="49" charset="0"/>
+              </a:rPr>
+              <a:t>i</a:t>
+            </a:r>
+            <a:r>
+              <a:rPr lang="en-US" dirty="0">
+                <a:latin typeface="Cascadia Code" panose="020B0609020000020004" pitchFamily="49" charset="0"/>
+                <a:ea typeface="Cascadia Code" panose="020B0609020000020004" pitchFamily="49" charset="0"/>
+                <a:cs typeface="Cascadia Code" panose="020B0609020000020004" pitchFamily="49" charset="0"/>
+              </a:rPr>
+              <a:t>);</a:t>
+            </a:r>
+          </a:p>
+          <a:p>
+            <a:r>
+              <a:rPr lang="en-US" dirty="0">
+                <a:latin typeface="Cascadia Code" panose="020B0609020000020004" pitchFamily="49" charset="0"/>
+                <a:ea typeface="Cascadia Code" panose="020B0609020000020004" pitchFamily="49" charset="0"/>
+                <a:cs typeface="Cascadia Code" panose="020B0609020000020004" pitchFamily="49" charset="0"/>
+              </a:rPr>
+              <a:t>        }</a:t>
+            </a:r>
+          </a:p>
+          <a:p>
+            <a:r>
+              <a:rPr lang="en-US" dirty="0">
+                <a:latin typeface="Cascadia Code" panose="020B0609020000020004" pitchFamily="49" charset="0"/>
+                <a:ea typeface="Cascadia Code" panose="020B0609020000020004" pitchFamily="49" charset="0"/>
+                <a:cs typeface="Cascadia Code" panose="020B0609020000020004" pitchFamily="49" charset="0"/>
+              </a:rPr>
+              <a:t>};</a:t>
+            </a:r>
+          </a:p>
+          <a:p>
+            <a:endParaRPr lang="en-US" dirty="0">
+              <a:latin typeface="Cascadia Code" panose="020B0609020000020004" pitchFamily="49" charset="0"/>
+              <a:ea typeface="Cascadia Code" panose="020B0609020000020004" pitchFamily="49" charset="0"/>
+              <a:cs typeface="Cascadia Code" panose="020B0609020000020004" pitchFamily="49" charset="0"/>
+            </a:endParaRPr>
+          </a:p>
+          <a:p>
+            <a:r>
+              <a:rPr lang="en-US" dirty="0">
+                <a:latin typeface="Cascadia Code" panose="020B0609020000020004" pitchFamily="49" charset="0"/>
+                <a:ea typeface="Cascadia Code" panose="020B0609020000020004" pitchFamily="49" charset="0"/>
+                <a:cs typeface="Cascadia Code" panose="020B0609020000020004" pitchFamily="49" charset="0"/>
+              </a:rPr>
+              <a:t>int main(int </a:t>
+            </a:r>
+            <a:r>
+              <a:rPr lang="en-US" dirty="0" err="1">
+                <a:latin typeface="Cascadia Code" panose="020B0609020000020004" pitchFamily="49" charset="0"/>
+                <a:ea typeface="Cascadia Code" panose="020B0609020000020004" pitchFamily="49" charset="0"/>
+                <a:cs typeface="Cascadia Code" panose="020B0609020000020004" pitchFamily="49" charset="0"/>
+              </a:rPr>
+              <a:t>argc</a:t>
+            </a:r>
+            <a:r>
+              <a:rPr lang="en-US" dirty="0">
+                <a:latin typeface="Cascadia Code" panose="020B0609020000020004" pitchFamily="49" charset="0"/>
+                <a:ea typeface="Cascadia Code" panose="020B0609020000020004" pitchFamily="49" charset="0"/>
+                <a:cs typeface="Cascadia Code" panose="020B0609020000020004" pitchFamily="49" charset="0"/>
+              </a:rPr>
+              <a:t>, char* </a:t>
+            </a:r>
+            <a:r>
+              <a:rPr lang="en-US" dirty="0" err="1">
+                <a:latin typeface="Cascadia Code" panose="020B0609020000020004" pitchFamily="49" charset="0"/>
+                <a:ea typeface="Cascadia Code" panose="020B0609020000020004" pitchFamily="49" charset="0"/>
+                <a:cs typeface="Cascadia Code" panose="020B0609020000020004" pitchFamily="49" charset="0"/>
+              </a:rPr>
+              <a:t>argv</a:t>
+            </a:r>
+            <a:r>
+              <a:rPr lang="en-US" dirty="0">
+                <a:latin typeface="Cascadia Code" panose="020B0609020000020004" pitchFamily="49" charset="0"/>
+                <a:ea typeface="Cascadia Code" panose="020B0609020000020004" pitchFamily="49" charset="0"/>
+                <a:cs typeface="Cascadia Code" panose="020B0609020000020004" pitchFamily="49" charset="0"/>
+              </a:rPr>
+              <a:t>[]) {</a:t>
+            </a:r>
+          </a:p>
+          <a:p>
+            <a:r>
+              <a:rPr lang="en-US" dirty="0">
+                <a:latin typeface="Cascadia Code" panose="020B0609020000020004" pitchFamily="49" charset="0"/>
+                <a:ea typeface="Cascadia Code" panose="020B0609020000020004" pitchFamily="49" charset="0"/>
+                <a:cs typeface="Cascadia Code" panose="020B0609020000020004" pitchFamily="49" charset="0"/>
+              </a:rPr>
+              <a:t>    </a:t>
+            </a:r>
+            <a:r>
+              <a:rPr lang="en-US" dirty="0" err="1">
+                <a:latin typeface="Cascadia Code" panose="020B0609020000020004" pitchFamily="49" charset="0"/>
+                <a:ea typeface="Cascadia Code" panose="020B0609020000020004" pitchFamily="49" charset="0"/>
+                <a:cs typeface="Cascadia Code" panose="020B0609020000020004" pitchFamily="49" charset="0"/>
+              </a:rPr>
+              <a:t>Kokkos</a:t>
+            </a:r>
+            <a:r>
+              <a:rPr lang="en-US" dirty="0">
+                <a:latin typeface="Cascadia Code" panose="020B0609020000020004" pitchFamily="49" charset="0"/>
+                <a:ea typeface="Cascadia Code" panose="020B0609020000020004" pitchFamily="49" charset="0"/>
+                <a:cs typeface="Cascadia Code" panose="020B0609020000020004" pitchFamily="49" charset="0"/>
+              </a:rPr>
+              <a:t>::initialize(</a:t>
+            </a:r>
+            <a:r>
+              <a:rPr lang="en-US" dirty="0" err="1">
+                <a:latin typeface="Cascadia Code" panose="020B0609020000020004" pitchFamily="49" charset="0"/>
+                <a:ea typeface="Cascadia Code" panose="020B0609020000020004" pitchFamily="49" charset="0"/>
+                <a:cs typeface="Cascadia Code" panose="020B0609020000020004" pitchFamily="49" charset="0"/>
+              </a:rPr>
+              <a:t>argc</a:t>
+            </a:r>
+            <a:r>
+              <a:rPr lang="en-US" dirty="0">
+                <a:latin typeface="Cascadia Code" panose="020B0609020000020004" pitchFamily="49" charset="0"/>
+                <a:ea typeface="Cascadia Code" panose="020B0609020000020004" pitchFamily="49" charset="0"/>
+                <a:cs typeface="Cascadia Code" panose="020B0609020000020004" pitchFamily="49" charset="0"/>
+              </a:rPr>
+              <a:t>, </a:t>
+            </a:r>
+            <a:r>
+              <a:rPr lang="en-US" dirty="0" err="1">
+                <a:latin typeface="Cascadia Code" panose="020B0609020000020004" pitchFamily="49" charset="0"/>
+                <a:ea typeface="Cascadia Code" panose="020B0609020000020004" pitchFamily="49" charset="0"/>
+                <a:cs typeface="Cascadia Code" panose="020B0609020000020004" pitchFamily="49" charset="0"/>
+              </a:rPr>
+              <a:t>argv</a:t>
+            </a:r>
+            <a:r>
+              <a:rPr lang="en-US" dirty="0">
+                <a:latin typeface="Cascadia Code" panose="020B0609020000020004" pitchFamily="49" charset="0"/>
+                <a:ea typeface="Cascadia Code" panose="020B0609020000020004" pitchFamily="49" charset="0"/>
+                <a:cs typeface="Cascadia Code" panose="020B0609020000020004" pitchFamily="49" charset="0"/>
+              </a:rPr>
+              <a:t>);</a:t>
+            </a:r>
+          </a:p>
+          <a:p>
+            <a:r>
+              <a:rPr lang="en-US" dirty="0">
+                <a:latin typeface="Cascadia Code" panose="020B0609020000020004" pitchFamily="49" charset="0"/>
+                <a:ea typeface="Cascadia Code" panose="020B0609020000020004" pitchFamily="49" charset="0"/>
+                <a:cs typeface="Cascadia Code" panose="020B0609020000020004" pitchFamily="49" charset="0"/>
+              </a:rPr>
+              <a:t>    </a:t>
+            </a:r>
+            <a:r>
+              <a:rPr lang="en-US" dirty="0" err="1">
+                <a:latin typeface="Cascadia Code" panose="020B0609020000020004" pitchFamily="49" charset="0"/>
+                <a:ea typeface="Cascadia Code" panose="020B0609020000020004" pitchFamily="49" charset="0"/>
+                <a:cs typeface="Cascadia Code" panose="020B0609020000020004" pitchFamily="49" charset="0"/>
+              </a:rPr>
+              <a:t>Kokkos</a:t>
+            </a:r>
+            <a:r>
+              <a:rPr lang="en-US" dirty="0">
+                <a:latin typeface="Cascadia Code" panose="020B0609020000020004" pitchFamily="49" charset="0"/>
+                <a:ea typeface="Cascadia Code" panose="020B0609020000020004" pitchFamily="49" charset="0"/>
+                <a:cs typeface="Cascadia Code" panose="020B0609020000020004" pitchFamily="49" charset="0"/>
+              </a:rPr>
+              <a:t>::</a:t>
+            </a:r>
+            <a:r>
+              <a:rPr lang="en-US" dirty="0" err="1">
+                <a:latin typeface="Cascadia Code" panose="020B0609020000020004" pitchFamily="49" charset="0"/>
+                <a:ea typeface="Cascadia Code" panose="020B0609020000020004" pitchFamily="49" charset="0"/>
+                <a:cs typeface="Cascadia Code" panose="020B0609020000020004" pitchFamily="49" charset="0"/>
+              </a:rPr>
+              <a:t>parallel_for</a:t>
+            </a:r>
+            <a:r>
+              <a:rPr lang="en-US" dirty="0">
+                <a:latin typeface="Cascadia Code" panose="020B0609020000020004" pitchFamily="49" charset="0"/>
+                <a:ea typeface="Cascadia Code" panose="020B0609020000020004" pitchFamily="49" charset="0"/>
+                <a:cs typeface="Cascadia Code" panose="020B0609020000020004" pitchFamily="49" charset="0"/>
+              </a:rPr>
+              <a:t>("HelloWorld", 15, </a:t>
+            </a:r>
+            <a:r>
+              <a:rPr lang="en-US" dirty="0" err="1">
+                <a:latin typeface="Cascadia Code" panose="020B0609020000020004" pitchFamily="49" charset="0"/>
+                <a:ea typeface="Cascadia Code" panose="020B0609020000020004" pitchFamily="49" charset="0"/>
+                <a:cs typeface="Cascadia Code" panose="020B0609020000020004" pitchFamily="49" charset="0"/>
+              </a:rPr>
+              <a:t>hello_world</a:t>
+            </a:r>
+            <a:r>
+              <a:rPr lang="en-US" dirty="0">
+                <a:latin typeface="Cascadia Code" panose="020B0609020000020004" pitchFamily="49" charset="0"/>
+                <a:ea typeface="Cascadia Code" panose="020B0609020000020004" pitchFamily="49" charset="0"/>
+                <a:cs typeface="Cascadia Code" panose="020B0609020000020004" pitchFamily="49" charset="0"/>
+              </a:rPr>
+              <a:t>());</a:t>
+            </a:r>
+          </a:p>
+          <a:p>
+            <a:r>
+              <a:rPr lang="en-US" dirty="0">
+                <a:latin typeface="Cascadia Code" panose="020B0609020000020004" pitchFamily="49" charset="0"/>
+                <a:ea typeface="Cascadia Code" panose="020B0609020000020004" pitchFamily="49" charset="0"/>
+                <a:cs typeface="Cascadia Code" panose="020B0609020000020004" pitchFamily="49" charset="0"/>
+              </a:rPr>
+              <a:t>    </a:t>
+            </a:r>
+            <a:r>
+              <a:rPr lang="en-US" dirty="0" err="1">
+                <a:latin typeface="Cascadia Code" panose="020B0609020000020004" pitchFamily="49" charset="0"/>
+                <a:ea typeface="Cascadia Code" panose="020B0609020000020004" pitchFamily="49" charset="0"/>
+                <a:cs typeface="Cascadia Code" panose="020B0609020000020004" pitchFamily="49" charset="0"/>
+              </a:rPr>
+              <a:t>Kokkos</a:t>
+            </a:r>
+            <a:r>
+              <a:rPr lang="en-US" dirty="0">
+                <a:latin typeface="Cascadia Code" panose="020B0609020000020004" pitchFamily="49" charset="0"/>
+                <a:ea typeface="Cascadia Code" panose="020B0609020000020004" pitchFamily="49" charset="0"/>
+                <a:cs typeface="Cascadia Code" panose="020B0609020000020004" pitchFamily="49" charset="0"/>
+              </a:rPr>
+              <a:t>::finalize();</a:t>
+            </a:r>
+          </a:p>
+          <a:p>
+            <a:r>
+              <a:rPr lang="en-US" dirty="0">
+                <a:latin typeface="Cascadia Code" panose="020B0609020000020004" pitchFamily="49" charset="0"/>
+                <a:ea typeface="Cascadia Code" panose="020B0609020000020004" pitchFamily="49" charset="0"/>
+                <a:cs typeface="Cascadia Code" panose="020B0609020000020004" pitchFamily="49" charset="0"/>
+              </a:rPr>
+              <a:t>    return 0;</a:t>
+            </a:r>
+          </a:p>
+          <a:p>
+            <a:r>
+              <a:rPr lang="en-US" dirty="0">
+                <a:latin typeface="Cascadia Code" panose="020B0609020000020004" pitchFamily="49" charset="0"/>
+                <a:ea typeface="Cascadia Code" panose="020B0609020000020004" pitchFamily="49" charset="0"/>
+                <a:cs typeface="Cascadia Code" panose="020B0609020000020004" pitchFamily="49" charset="0"/>
+              </a:rPr>
+              <a:t>}</a:t>
+            </a:r>
+          </a:p>
+        </p:txBody>
+      </p:sp>
+      <p:grpSp>
+        <p:nvGrpSpPr>
+          <p:cNvPr id="8" name="Group 7">
+            <a:extLst>
+              <a:ext uri="{FF2B5EF4-FFF2-40B4-BE49-F238E27FC236}">
+                <a16:creationId xmlns:a16="http://schemas.microsoft.com/office/drawing/2014/main" id="{79E303C4-D764-C26E-C9BD-E8D9ED74B23B}"/>
+              </a:ext>
+            </a:extLst>
+          </p:cNvPr>
+          <p:cNvGrpSpPr/>
+          <p:nvPr/>
+        </p:nvGrpSpPr>
+        <p:grpSpPr>
+          <a:xfrm>
+            <a:off x="4636655" y="259962"/>
+            <a:ext cx="6214126" cy="1367884"/>
+            <a:chOff x="4833622" y="905256"/>
+            <a:chExt cx="6214126" cy="1367884"/>
+          </a:xfrm>
+        </p:grpSpPr>
+        <p:sp>
+          <p:nvSpPr>
+            <p:cNvPr id="5" name="TextBox 4">
+              <a:extLst>
+                <a:ext uri="{FF2B5EF4-FFF2-40B4-BE49-F238E27FC236}">
+                  <a16:creationId xmlns:a16="http://schemas.microsoft.com/office/drawing/2014/main" id="{454D6244-0B03-19A3-27E3-38B435AB80B4}"/>
+                </a:ext>
+              </a:extLst>
+            </p:cNvPr>
+            <p:cNvSpPr txBox="1"/>
+            <p:nvPr/>
+          </p:nvSpPr>
+          <p:spPr>
+            <a:xfrm>
+              <a:off x="9811512" y="905256"/>
+              <a:ext cx="1236236" cy="369332"/>
+            </a:xfrm>
+            <a:prstGeom prst="rect">
+              <a:avLst/>
+            </a:prstGeom>
+            <a:noFill/>
+            <a:ln>
+              <a:solidFill>
+                <a:schemeClr val="tx1"/>
+              </a:solidFill>
+            </a:ln>
+          </p:spPr>
+          <p:txBody>
+            <a:bodyPr wrap="none" rtlCol="0">
+              <a:spAutoFit/>
+            </a:bodyPr>
+            <a:lstStyle/>
+            <a:p>
+              <a:r>
+                <a:rPr lang="en-US" dirty="0"/>
+                <a:t>header file</a:t>
+              </a:r>
+            </a:p>
+          </p:txBody>
+        </p:sp>
+        <p:cxnSp>
+          <p:nvCxnSpPr>
+            <p:cNvPr id="7" name="Straight Arrow Connector 6">
+              <a:extLst>
+                <a:ext uri="{FF2B5EF4-FFF2-40B4-BE49-F238E27FC236}">
+                  <a16:creationId xmlns:a16="http://schemas.microsoft.com/office/drawing/2014/main" id="{12EA4959-3BBD-99CE-24C6-9B3F30B418D3}"/>
+                </a:ext>
+              </a:extLst>
+            </p:cNvPr>
+            <p:cNvCxnSpPr>
+              <a:cxnSpLocks/>
+              <a:stCxn id="5" idx="1"/>
+            </p:cNvCxnSpPr>
+            <p:nvPr/>
+          </p:nvCxnSpPr>
+          <p:spPr>
+            <a:xfrm flipH="1">
+              <a:off x="4833622" y="1089922"/>
+              <a:ext cx="4977890" cy="1183218"/>
+            </a:xfrm>
+            <a:prstGeom prst="straightConnector1">
+              <a:avLst/>
+            </a:prstGeom>
+            <a:ln>
+              <a:solidFill>
+                <a:schemeClr val="tx1"/>
+              </a:solidFill>
+              <a:tailEnd type="stealth" w="lg" len="lg"/>
+            </a:ln>
+          </p:spPr>
+          <p:style>
+            <a:lnRef idx="2">
+              <a:schemeClr val="accent1"/>
+            </a:lnRef>
+            <a:fillRef idx="0">
+              <a:schemeClr val="accent1"/>
+            </a:fillRef>
+            <a:effectRef idx="1">
+              <a:schemeClr val="accent1"/>
+            </a:effectRef>
+            <a:fontRef idx="minor">
+              <a:schemeClr val="tx1"/>
+            </a:fontRef>
+          </p:style>
+        </p:cxnSp>
+      </p:grpSp>
+      <p:grpSp>
+        <p:nvGrpSpPr>
+          <p:cNvPr id="9" name="Group 8">
+            <a:extLst>
+              <a:ext uri="{FF2B5EF4-FFF2-40B4-BE49-F238E27FC236}">
+                <a16:creationId xmlns:a16="http://schemas.microsoft.com/office/drawing/2014/main" id="{7DC83CA0-BD93-2395-8990-92EDEA4DDDA3}"/>
+              </a:ext>
+            </a:extLst>
+          </p:cNvPr>
+          <p:cNvGrpSpPr/>
+          <p:nvPr/>
+        </p:nvGrpSpPr>
+        <p:grpSpPr>
+          <a:xfrm>
+            <a:off x="3269673" y="949676"/>
+            <a:ext cx="8256592" cy="1332880"/>
+            <a:chOff x="3500581" y="905256"/>
+            <a:chExt cx="8256592" cy="1332880"/>
+          </a:xfrm>
+        </p:grpSpPr>
+        <p:sp>
+          <p:nvSpPr>
+            <p:cNvPr id="10" name="TextBox 9">
+              <a:extLst>
+                <a:ext uri="{FF2B5EF4-FFF2-40B4-BE49-F238E27FC236}">
+                  <a16:creationId xmlns:a16="http://schemas.microsoft.com/office/drawing/2014/main" id="{E66BC249-9107-E919-FABC-25520A1EC6C5}"/>
+                </a:ext>
+              </a:extLst>
+            </p:cNvPr>
+            <p:cNvSpPr txBox="1"/>
+            <p:nvPr/>
+          </p:nvSpPr>
+          <p:spPr>
+            <a:xfrm>
+              <a:off x="9811512" y="905256"/>
+              <a:ext cx="1945661" cy="369332"/>
+            </a:xfrm>
+            <a:prstGeom prst="rect">
+              <a:avLst/>
+            </a:prstGeom>
+            <a:noFill/>
+            <a:ln>
+              <a:solidFill>
+                <a:schemeClr val="tx1"/>
+              </a:solidFill>
+            </a:ln>
+          </p:spPr>
+          <p:txBody>
+            <a:bodyPr wrap="none" rtlCol="0">
+              <a:spAutoFit/>
+            </a:bodyPr>
+            <a:lstStyle/>
+            <a:p>
+              <a:r>
+                <a:rPr lang="en-US" dirty="0"/>
+                <a:t>Functor definition</a:t>
+              </a:r>
+            </a:p>
+          </p:txBody>
+        </p:sp>
+        <p:cxnSp>
+          <p:nvCxnSpPr>
+            <p:cNvPr id="11" name="Straight Arrow Connector 10">
+              <a:extLst>
+                <a:ext uri="{FF2B5EF4-FFF2-40B4-BE49-F238E27FC236}">
+                  <a16:creationId xmlns:a16="http://schemas.microsoft.com/office/drawing/2014/main" id="{282A0D2C-4864-2130-F532-00BF7A1FE31F}"/>
+                </a:ext>
+              </a:extLst>
+            </p:cNvPr>
+            <p:cNvCxnSpPr>
+              <a:cxnSpLocks/>
+              <a:stCxn id="10" idx="1"/>
+            </p:cNvCxnSpPr>
+            <p:nvPr/>
+          </p:nvCxnSpPr>
+          <p:spPr>
+            <a:xfrm flipH="1">
+              <a:off x="3500581" y="1089922"/>
+              <a:ext cx="6310931" cy="1148214"/>
+            </a:xfrm>
+            <a:prstGeom prst="straightConnector1">
+              <a:avLst/>
+            </a:prstGeom>
+            <a:ln>
+              <a:solidFill>
+                <a:schemeClr val="tx1"/>
+              </a:solidFill>
+              <a:tailEnd type="stealth" w="lg" len="lg"/>
+            </a:ln>
+          </p:spPr>
+          <p:style>
+            <a:lnRef idx="2">
+              <a:schemeClr val="accent1"/>
+            </a:lnRef>
+            <a:fillRef idx="0">
+              <a:schemeClr val="accent1"/>
+            </a:fillRef>
+            <a:effectRef idx="1">
+              <a:schemeClr val="accent1"/>
+            </a:effectRef>
+            <a:fontRef idx="minor">
+              <a:schemeClr val="tx1"/>
+            </a:fontRef>
+          </p:style>
+        </p:cxnSp>
+      </p:grpSp>
+      <p:grpSp>
+        <p:nvGrpSpPr>
+          <p:cNvPr id="12" name="Group 11">
+            <a:extLst>
+              <a:ext uri="{FF2B5EF4-FFF2-40B4-BE49-F238E27FC236}">
+                <a16:creationId xmlns:a16="http://schemas.microsoft.com/office/drawing/2014/main" id="{B2EEA736-71E3-9D3D-77CE-674A2022A6A9}"/>
+              </a:ext>
+            </a:extLst>
+          </p:cNvPr>
+          <p:cNvGrpSpPr/>
+          <p:nvPr/>
+        </p:nvGrpSpPr>
+        <p:grpSpPr>
+          <a:xfrm>
+            <a:off x="4636655" y="1597633"/>
+            <a:ext cx="6881936" cy="1110055"/>
+            <a:chOff x="4802909" y="905256"/>
+            <a:chExt cx="6881936" cy="1110055"/>
+          </a:xfrm>
+        </p:grpSpPr>
+        <p:sp>
+          <p:nvSpPr>
+            <p:cNvPr id="13" name="TextBox 12">
+              <a:extLst>
+                <a:ext uri="{FF2B5EF4-FFF2-40B4-BE49-F238E27FC236}">
+                  <a16:creationId xmlns:a16="http://schemas.microsoft.com/office/drawing/2014/main" id="{CFB71D1F-9FC3-CB7A-4473-1BD50B71BE7D}"/>
+                </a:ext>
+              </a:extLst>
+            </p:cNvPr>
+            <p:cNvSpPr txBox="1"/>
+            <p:nvPr/>
+          </p:nvSpPr>
+          <p:spPr>
+            <a:xfrm>
+              <a:off x="9811512" y="905256"/>
+              <a:ext cx="1873333" cy="646331"/>
+            </a:xfrm>
+            <a:prstGeom prst="rect">
+              <a:avLst/>
+            </a:prstGeom>
+            <a:noFill/>
+            <a:ln>
+              <a:solidFill>
+                <a:schemeClr val="tx1"/>
+              </a:solidFill>
+            </a:ln>
+          </p:spPr>
+          <p:txBody>
+            <a:bodyPr wrap="none" rtlCol="0">
+              <a:spAutoFit/>
+            </a:bodyPr>
+            <a:lstStyle/>
+            <a:p>
+              <a:r>
+                <a:rPr lang="en-US" dirty="0"/>
+                <a:t>mark  as suitable</a:t>
+              </a:r>
+              <a:br>
+                <a:rPr lang="en-US" dirty="0"/>
+              </a:br>
+              <a:r>
+                <a:rPr lang="en-US" dirty="0"/>
+                <a:t>for CUDA or HIP</a:t>
+              </a:r>
+            </a:p>
+          </p:txBody>
+        </p:sp>
+        <p:cxnSp>
+          <p:nvCxnSpPr>
+            <p:cNvPr id="14" name="Straight Arrow Connector 13">
+              <a:extLst>
+                <a:ext uri="{FF2B5EF4-FFF2-40B4-BE49-F238E27FC236}">
+                  <a16:creationId xmlns:a16="http://schemas.microsoft.com/office/drawing/2014/main" id="{3C3AFD0A-9880-F10F-C1B8-DA094F732A7E}"/>
+                </a:ext>
+              </a:extLst>
+            </p:cNvPr>
+            <p:cNvCxnSpPr>
+              <a:cxnSpLocks/>
+              <a:stCxn id="13" idx="1"/>
+            </p:cNvCxnSpPr>
+            <p:nvPr/>
+          </p:nvCxnSpPr>
+          <p:spPr>
+            <a:xfrm flipH="1">
+              <a:off x="4802909" y="1228422"/>
+              <a:ext cx="5008603" cy="786889"/>
+            </a:xfrm>
+            <a:prstGeom prst="straightConnector1">
+              <a:avLst/>
+            </a:prstGeom>
+            <a:ln>
+              <a:solidFill>
+                <a:schemeClr val="tx1"/>
+              </a:solidFill>
+              <a:tailEnd type="stealth" w="lg" len="lg"/>
+            </a:ln>
+          </p:spPr>
+          <p:style>
+            <a:lnRef idx="2">
+              <a:schemeClr val="accent1"/>
+            </a:lnRef>
+            <a:fillRef idx="0">
+              <a:schemeClr val="accent1"/>
+            </a:fillRef>
+            <a:effectRef idx="1">
+              <a:schemeClr val="accent1"/>
+            </a:effectRef>
+            <a:fontRef idx="minor">
+              <a:schemeClr val="tx1"/>
+            </a:fontRef>
+          </p:style>
+        </p:cxnSp>
+      </p:grpSp>
+      <p:grpSp>
+        <p:nvGrpSpPr>
+          <p:cNvPr id="16" name="Group 15">
+            <a:extLst>
+              <a:ext uri="{FF2B5EF4-FFF2-40B4-BE49-F238E27FC236}">
+                <a16:creationId xmlns:a16="http://schemas.microsoft.com/office/drawing/2014/main" id="{1B44AFF8-E1CF-8612-63B1-BAF6B5A8C2E2}"/>
+              </a:ext>
+            </a:extLst>
+          </p:cNvPr>
+          <p:cNvGrpSpPr/>
+          <p:nvPr/>
+        </p:nvGrpSpPr>
+        <p:grpSpPr>
+          <a:xfrm>
+            <a:off x="5745018" y="2411519"/>
+            <a:ext cx="5105763" cy="460990"/>
+            <a:chOff x="5911272" y="905256"/>
+            <a:chExt cx="5105763" cy="460990"/>
+          </a:xfrm>
+        </p:grpSpPr>
+        <p:sp>
+          <p:nvSpPr>
+            <p:cNvPr id="17" name="TextBox 16">
+              <a:extLst>
+                <a:ext uri="{FF2B5EF4-FFF2-40B4-BE49-F238E27FC236}">
+                  <a16:creationId xmlns:a16="http://schemas.microsoft.com/office/drawing/2014/main" id="{79BB7E20-2B33-A09C-CF2B-1ED83D66F085}"/>
+                </a:ext>
+              </a:extLst>
+            </p:cNvPr>
+            <p:cNvSpPr txBox="1"/>
+            <p:nvPr/>
+          </p:nvSpPr>
+          <p:spPr>
+            <a:xfrm>
+              <a:off x="9811512" y="905256"/>
+              <a:ext cx="1205523" cy="369332"/>
+            </a:xfrm>
+            <a:prstGeom prst="rect">
+              <a:avLst/>
+            </a:prstGeom>
+            <a:noFill/>
+            <a:ln>
+              <a:solidFill>
+                <a:schemeClr val="tx1"/>
+              </a:solidFill>
+            </a:ln>
+          </p:spPr>
+          <p:txBody>
+            <a:bodyPr wrap="none" rtlCol="0">
+              <a:spAutoFit/>
+            </a:bodyPr>
+            <a:lstStyle/>
+            <a:p>
+              <a:r>
+                <a:rPr lang="en-US" dirty="0"/>
+                <a:t>loop index</a:t>
+              </a:r>
+            </a:p>
+          </p:txBody>
+        </p:sp>
+        <p:cxnSp>
+          <p:nvCxnSpPr>
+            <p:cNvPr id="18" name="Straight Arrow Connector 17">
+              <a:extLst>
+                <a:ext uri="{FF2B5EF4-FFF2-40B4-BE49-F238E27FC236}">
+                  <a16:creationId xmlns:a16="http://schemas.microsoft.com/office/drawing/2014/main" id="{8948C481-7110-6EBD-1F04-0518770A3DB4}"/>
+                </a:ext>
+              </a:extLst>
+            </p:cNvPr>
+            <p:cNvCxnSpPr>
+              <a:cxnSpLocks/>
+              <a:stCxn id="17" idx="1"/>
+            </p:cNvCxnSpPr>
+            <p:nvPr/>
+          </p:nvCxnSpPr>
+          <p:spPr>
+            <a:xfrm flipH="1">
+              <a:off x="5911272" y="1089922"/>
+              <a:ext cx="3900240" cy="276324"/>
+            </a:xfrm>
+            <a:prstGeom prst="straightConnector1">
+              <a:avLst/>
+            </a:prstGeom>
+            <a:ln>
+              <a:solidFill>
+                <a:schemeClr val="tx1"/>
+              </a:solidFill>
+              <a:tailEnd type="stealth" w="lg" len="lg"/>
+            </a:ln>
+          </p:spPr>
+          <p:style>
+            <a:lnRef idx="2">
+              <a:schemeClr val="accent1"/>
+            </a:lnRef>
+            <a:fillRef idx="0">
+              <a:schemeClr val="accent1"/>
+            </a:fillRef>
+            <a:effectRef idx="1">
+              <a:schemeClr val="accent1"/>
+            </a:effectRef>
+            <a:fontRef idx="minor">
+              <a:schemeClr val="tx1"/>
+            </a:fontRef>
+          </p:style>
+        </p:cxnSp>
+      </p:grpSp>
+      <p:grpSp>
+        <p:nvGrpSpPr>
+          <p:cNvPr id="25" name="Group 24">
+            <a:extLst>
+              <a:ext uri="{FF2B5EF4-FFF2-40B4-BE49-F238E27FC236}">
+                <a16:creationId xmlns:a16="http://schemas.microsoft.com/office/drawing/2014/main" id="{ED6A5EFC-FA12-606D-78C4-BCBB140BB602}"/>
+              </a:ext>
+            </a:extLst>
+          </p:cNvPr>
+          <p:cNvGrpSpPr/>
+          <p:nvPr/>
+        </p:nvGrpSpPr>
+        <p:grpSpPr>
+          <a:xfrm>
+            <a:off x="4359564" y="3383074"/>
+            <a:ext cx="7056820" cy="646331"/>
+            <a:chOff x="4525818" y="905256"/>
+            <a:chExt cx="7056820" cy="646331"/>
+          </a:xfrm>
+        </p:grpSpPr>
+        <p:sp>
+          <p:nvSpPr>
+            <p:cNvPr id="26" name="TextBox 25">
+              <a:extLst>
+                <a:ext uri="{FF2B5EF4-FFF2-40B4-BE49-F238E27FC236}">
+                  <a16:creationId xmlns:a16="http://schemas.microsoft.com/office/drawing/2014/main" id="{1293C870-9FBE-3EA1-E7D0-62E69C7C8032}"/>
+                </a:ext>
+              </a:extLst>
+            </p:cNvPr>
+            <p:cNvSpPr txBox="1"/>
+            <p:nvPr/>
+          </p:nvSpPr>
+          <p:spPr>
+            <a:xfrm>
+              <a:off x="9811512" y="905256"/>
+              <a:ext cx="1771126" cy="646331"/>
+            </a:xfrm>
+            <a:prstGeom prst="rect">
+              <a:avLst/>
+            </a:prstGeom>
+            <a:noFill/>
+            <a:ln>
+              <a:solidFill>
+                <a:schemeClr val="tx1"/>
+              </a:solidFill>
+            </a:ln>
+          </p:spPr>
+          <p:txBody>
+            <a:bodyPr wrap="none" rtlCol="0">
+              <a:spAutoFit/>
+            </a:bodyPr>
+            <a:lstStyle/>
+            <a:p>
+              <a:r>
+                <a:rPr lang="en-US" dirty="0"/>
+                <a:t>Atomic I/O, also</a:t>
+              </a:r>
+              <a:br>
+                <a:rPr lang="en-US" dirty="0"/>
+              </a:br>
+              <a:r>
+                <a:rPr lang="en-US" dirty="0"/>
+                <a:t>from device</a:t>
+              </a:r>
+            </a:p>
+          </p:txBody>
+        </p:sp>
+        <p:cxnSp>
+          <p:nvCxnSpPr>
+            <p:cNvPr id="27" name="Straight Arrow Connector 26">
+              <a:extLst>
+                <a:ext uri="{FF2B5EF4-FFF2-40B4-BE49-F238E27FC236}">
+                  <a16:creationId xmlns:a16="http://schemas.microsoft.com/office/drawing/2014/main" id="{8CD3B655-F62D-2E9A-4139-1E0CE0C1FBE4}"/>
+                </a:ext>
+              </a:extLst>
+            </p:cNvPr>
+            <p:cNvCxnSpPr>
+              <a:cxnSpLocks/>
+              <a:stCxn id="26" idx="1"/>
+            </p:cNvCxnSpPr>
+            <p:nvPr/>
+          </p:nvCxnSpPr>
+          <p:spPr>
+            <a:xfrm flipH="1" flipV="1">
+              <a:off x="4525818" y="905256"/>
+              <a:ext cx="5285694" cy="323166"/>
+            </a:xfrm>
+            <a:prstGeom prst="straightConnector1">
+              <a:avLst/>
+            </a:prstGeom>
+            <a:ln>
+              <a:solidFill>
+                <a:schemeClr val="tx1"/>
+              </a:solidFill>
+              <a:tailEnd type="stealth" w="lg" len="lg"/>
+            </a:ln>
+          </p:spPr>
+          <p:style>
+            <a:lnRef idx="2">
+              <a:schemeClr val="accent1"/>
+            </a:lnRef>
+            <a:fillRef idx="0">
+              <a:schemeClr val="accent1"/>
+            </a:fillRef>
+            <a:effectRef idx="1">
+              <a:schemeClr val="accent1"/>
+            </a:effectRef>
+            <a:fontRef idx="minor">
+              <a:schemeClr val="tx1"/>
+            </a:fontRef>
+          </p:style>
+        </p:cxnSp>
+      </p:grpSp>
+      <p:grpSp>
+        <p:nvGrpSpPr>
+          <p:cNvPr id="29" name="Group 28">
+            <a:extLst>
+              <a:ext uri="{FF2B5EF4-FFF2-40B4-BE49-F238E27FC236}">
+                <a16:creationId xmlns:a16="http://schemas.microsoft.com/office/drawing/2014/main" id="{3DCBD1ED-68BB-B8FC-295A-CB8FF80EA3EB}"/>
+              </a:ext>
+            </a:extLst>
+          </p:cNvPr>
+          <p:cNvGrpSpPr/>
+          <p:nvPr/>
+        </p:nvGrpSpPr>
+        <p:grpSpPr>
+          <a:xfrm>
+            <a:off x="6425138" y="4216805"/>
+            <a:ext cx="5369876" cy="556732"/>
+            <a:chOff x="6591392" y="905256"/>
+            <a:chExt cx="5369876" cy="556732"/>
+          </a:xfrm>
+        </p:grpSpPr>
+        <p:sp>
+          <p:nvSpPr>
+            <p:cNvPr id="30" name="TextBox 29">
+              <a:extLst>
+                <a:ext uri="{FF2B5EF4-FFF2-40B4-BE49-F238E27FC236}">
+                  <a16:creationId xmlns:a16="http://schemas.microsoft.com/office/drawing/2014/main" id="{1C3C906C-5F31-DCDB-1BC0-438F8AE946BA}"/>
+                </a:ext>
+              </a:extLst>
+            </p:cNvPr>
+            <p:cNvSpPr txBox="1"/>
+            <p:nvPr/>
+          </p:nvSpPr>
+          <p:spPr>
+            <a:xfrm>
+              <a:off x="9811512" y="905256"/>
+              <a:ext cx="2149756" cy="369332"/>
+            </a:xfrm>
+            <a:prstGeom prst="rect">
+              <a:avLst/>
+            </a:prstGeom>
+            <a:noFill/>
+            <a:ln>
+              <a:solidFill>
+                <a:schemeClr val="tx1"/>
+              </a:solidFill>
+            </a:ln>
+          </p:spPr>
+          <p:txBody>
+            <a:bodyPr wrap="none" rtlCol="0">
+              <a:spAutoFit/>
+            </a:bodyPr>
+            <a:lstStyle/>
+            <a:p>
+              <a:r>
+                <a:rPr lang="en-US" dirty="0" err="1"/>
+                <a:t>Kokkos</a:t>
+              </a:r>
+              <a:r>
+                <a:rPr lang="en-US" dirty="0"/>
+                <a:t> initialization</a:t>
+              </a:r>
+            </a:p>
+          </p:txBody>
+        </p:sp>
+        <p:cxnSp>
+          <p:nvCxnSpPr>
+            <p:cNvPr id="31" name="Straight Arrow Connector 30">
+              <a:extLst>
+                <a:ext uri="{FF2B5EF4-FFF2-40B4-BE49-F238E27FC236}">
+                  <a16:creationId xmlns:a16="http://schemas.microsoft.com/office/drawing/2014/main" id="{9CA86CD2-E628-FC35-CA1D-017782DAFE6F}"/>
+                </a:ext>
+              </a:extLst>
+            </p:cNvPr>
+            <p:cNvCxnSpPr>
+              <a:cxnSpLocks/>
+              <a:stCxn id="30" idx="1"/>
+            </p:cNvCxnSpPr>
+            <p:nvPr/>
+          </p:nvCxnSpPr>
+          <p:spPr>
+            <a:xfrm flipH="1">
+              <a:off x="6591392" y="1089922"/>
+              <a:ext cx="3220120" cy="372066"/>
+            </a:xfrm>
+            <a:prstGeom prst="straightConnector1">
+              <a:avLst/>
+            </a:prstGeom>
+            <a:ln>
+              <a:solidFill>
+                <a:schemeClr val="tx1"/>
+              </a:solidFill>
+              <a:tailEnd type="stealth" w="lg" len="lg"/>
+            </a:ln>
+          </p:spPr>
+          <p:style>
+            <a:lnRef idx="2">
+              <a:schemeClr val="accent1"/>
+            </a:lnRef>
+            <a:fillRef idx="0">
+              <a:schemeClr val="accent1"/>
+            </a:fillRef>
+            <a:effectRef idx="1">
+              <a:schemeClr val="accent1"/>
+            </a:effectRef>
+            <a:fontRef idx="minor">
+              <a:schemeClr val="tx1"/>
+            </a:fontRef>
+          </p:style>
+        </p:cxnSp>
+      </p:grpSp>
+      <p:grpSp>
+        <p:nvGrpSpPr>
+          <p:cNvPr id="32" name="Group 31">
+            <a:extLst>
+              <a:ext uri="{FF2B5EF4-FFF2-40B4-BE49-F238E27FC236}">
+                <a16:creationId xmlns:a16="http://schemas.microsoft.com/office/drawing/2014/main" id="{D49465DF-187A-AB95-CC2C-31E51439289D}"/>
+              </a:ext>
+            </a:extLst>
+          </p:cNvPr>
+          <p:cNvGrpSpPr/>
+          <p:nvPr/>
+        </p:nvGrpSpPr>
+        <p:grpSpPr>
+          <a:xfrm>
+            <a:off x="4054764" y="5280708"/>
+            <a:ext cx="5596001" cy="1340887"/>
+            <a:chOff x="5864873" y="-66299"/>
+            <a:chExt cx="5596001" cy="1340887"/>
+          </a:xfrm>
+        </p:grpSpPr>
+        <p:sp>
+          <p:nvSpPr>
+            <p:cNvPr id="33" name="TextBox 32">
+              <a:extLst>
+                <a:ext uri="{FF2B5EF4-FFF2-40B4-BE49-F238E27FC236}">
+                  <a16:creationId xmlns:a16="http://schemas.microsoft.com/office/drawing/2014/main" id="{10AF2B96-2EEA-AAB3-7034-0FA573C142B0}"/>
+                </a:ext>
+              </a:extLst>
+            </p:cNvPr>
+            <p:cNvSpPr txBox="1"/>
+            <p:nvPr/>
+          </p:nvSpPr>
+          <p:spPr>
+            <a:xfrm>
+              <a:off x="9811512" y="905256"/>
+              <a:ext cx="1649362" cy="369332"/>
+            </a:xfrm>
+            <a:prstGeom prst="rect">
+              <a:avLst/>
+            </a:prstGeom>
+            <a:noFill/>
+            <a:ln>
+              <a:solidFill>
+                <a:schemeClr val="tx1"/>
+              </a:solidFill>
+            </a:ln>
+          </p:spPr>
+          <p:txBody>
+            <a:bodyPr wrap="none" rtlCol="0">
+              <a:spAutoFit/>
+            </a:bodyPr>
+            <a:lstStyle/>
+            <a:p>
+              <a:r>
+                <a:rPr lang="en-US" dirty="0" err="1"/>
+                <a:t>Kokkos</a:t>
+              </a:r>
+              <a:r>
+                <a:rPr lang="en-US" dirty="0"/>
+                <a:t> finalize</a:t>
+              </a:r>
+            </a:p>
+          </p:txBody>
+        </p:sp>
+        <p:cxnSp>
+          <p:nvCxnSpPr>
+            <p:cNvPr id="34" name="Straight Arrow Connector 33">
+              <a:extLst>
+                <a:ext uri="{FF2B5EF4-FFF2-40B4-BE49-F238E27FC236}">
+                  <a16:creationId xmlns:a16="http://schemas.microsoft.com/office/drawing/2014/main" id="{2C4246AD-2A91-FA9B-4677-B7E617F2C6EC}"/>
+                </a:ext>
+              </a:extLst>
+            </p:cNvPr>
+            <p:cNvCxnSpPr>
+              <a:cxnSpLocks/>
+              <a:stCxn id="33" idx="1"/>
+            </p:cNvCxnSpPr>
+            <p:nvPr/>
+          </p:nvCxnSpPr>
+          <p:spPr>
+            <a:xfrm flipH="1" flipV="1">
+              <a:off x="5864873" y="-66299"/>
+              <a:ext cx="3946639" cy="1156221"/>
+            </a:xfrm>
+            <a:prstGeom prst="straightConnector1">
+              <a:avLst/>
+            </a:prstGeom>
+            <a:ln>
+              <a:solidFill>
+                <a:schemeClr val="tx1"/>
+              </a:solidFill>
+              <a:tailEnd type="stealth" w="lg" len="lg"/>
+            </a:ln>
+          </p:spPr>
+          <p:style>
+            <a:lnRef idx="2">
+              <a:schemeClr val="accent1"/>
+            </a:lnRef>
+            <a:fillRef idx="0">
+              <a:schemeClr val="accent1"/>
+            </a:fillRef>
+            <a:effectRef idx="1">
+              <a:schemeClr val="accent1"/>
+            </a:effectRef>
+            <a:fontRef idx="minor">
+              <a:schemeClr val="tx1"/>
+            </a:fontRef>
+          </p:style>
+        </p:cxnSp>
+      </p:grpSp>
+      <p:sp>
+        <p:nvSpPr>
+          <p:cNvPr id="35" name="Slide Number Placeholder 34">
+            <a:extLst>
+              <a:ext uri="{FF2B5EF4-FFF2-40B4-BE49-F238E27FC236}">
+                <a16:creationId xmlns:a16="http://schemas.microsoft.com/office/drawing/2014/main" id="{A94BD86D-A285-4C42-3314-03D150A99067}"/>
+              </a:ext>
+            </a:extLst>
+          </p:cNvPr>
+          <p:cNvSpPr>
+            <a:spLocks noGrp="1"/>
+          </p:cNvSpPr>
+          <p:nvPr>
+            <p:ph type="sldNum" sz="quarter" idx="12"/>
+          </p:nvPr>
+        </p:nvSpPr>
+        <p:spPr/>
+        <p:txBody>
+          <a:bodyPr/>
+          <a:lstStyle/>
+          <a:p>
+            <a:fld id="{8FE49E37-3F56-4533-A4C2-6E22C2CD2E23}" type="slidenum">
+              <a:rPr lang="LID4096" smtClean="0"/>
+              <a:t>11</a:t>
+            </a:fld>
+            <a:endParaRPr lang="LID4096"/>
+          </a:p>
+        </p:txBody>
+      </p:sp>
+    </p:spTree>
+    <p:extLst>
+      <p:ext uri="{BB962C8B-B14F-4D97-AF65-F5344CB8AC3E}">
+        <p14:creationId xmlns:p14="http://schemas.microsoft.com/office/powerpoint/2010/main" val="2639327393"/>
       </p:ext>
     </p:extLst>
   </p:cSld>
@@ -5595,6 +7282,35 @@
           </a:p>
         </p:txBody>
       </p:sp>
+      <p:sp>
+        <p:nvSpPr>
+          <p:cNvPr id="4" name="Slide Number Placeholder 3">
+            <a:extLst>
+              <a:ext uri="{FF2B5EF4-FFF2-40B4-BE49-F238E27FC236}">
+                <a16:creationId xmlns:a16="http://schemas.microsoft.com/office/drawing/2014/main" id="{115CAB05-B1AC-9BE0-C3E4-3216A93C0401}"/>
+              </a:ext>
+            </a:extLst>
+          </p:cNvPr>
+          <p:cNvSpPr>
+            <a:spLocks noGrp="1"/>
+          </p:cNvSpPr>
+          <p:nvPr>
+            <p:ph type="sldNum" sz="quarter" idx="12"/>
+          </p:nvPr>
+        </p:nvSpPr>
+        <p:spPr/>
+        <p:txBody>
+          <a:bodyPr/>
+          <a:lstStyle/>
+          <a:p>
+            <a:fld id="{8FE49E37-3F56-4533-A4C2-6E22C2CD2E23}" type="slidenum">
+              <a:rPr lang="LID4096" smtClean="0"/>
+              <a:t>5</a:t>
+            </a:fld>
+            <a:endParaRPr lang="LID4096"/>
+          </a:p>
+        </p:txBody>
+      </p:sp>
     </p:spTree>
     <p:extLst>
       <p:ext uri="{BB962C8B-B14F-4D97-AF65-F5344CB8AC3E}">
@@ -5859,6 +7575,35 @@
           </p:style>
         </p:cxnSp>
       </p:grpSp>
+      <p:sp>
+        <p:nvSpPr>
+          <p:cNvPr id="4" name="Slide Number Placeholder 3">
+            <a:extLst>
+              <a:ext uri="{FF2B5EF4-FFF2-40B4-BE49-F238E27FC236}">
+                <a16:creationId xmlns:a16="http://schemas.microsoft.com/office/drawing/2014/main" id="{F2F7223A-5F9D-0F09-F258-7A7835D515EF}"/>
+              </a:ext>
+            </a:extLst>
+          </p:cNvPr>
+          <p:cNvSpPr>
+            <a:spLocks noGrp="1"/>
+          </p:cNvSpPr>
+          <p:nvPr>
+            <p:ph type="sldNum" sz="quarter" idx="12"/>
+          </p:nvPr>
+        </p:nvSpPr>
+        <p:spPr/>
+        <p:txBody>
+          <a:bodyPr/>
+          <a:lstStyle/>
+          <a:p>
+            <a:fld id="{8FE49E37-3F56-4533-A4C2-6E22C2CD2E23}" type="slidenum">
+              <a:rPr lang="LID4096" smtClean="0"/>
+              <a:t>6</a:t>
+            </a:fld>
+            <a:endParaRPr lang="LID4096"/>
+          </a:p>
+        </p:txBody>
+      </p:sp>
     </p:spTree>
     <p:extLst>
       <p:ext uri="{BB962C8B-B14F-4D97-AF65-F5344CB8AC3E}">
@@ -5943,6 +7688,35 @@
           </a:p>
         </p:txBody>
       </p:sp>
+      <p:sp>
+        <p:nvSpPr>
+          <p:cNvPr id="4" name="Slide Number Placeholder 3">
+            <a:extLst>
+              <a:ext uri="{FF2B5EF4-FFF2-40B4-BE49-F238E27FC236}">
+                <a16:creationId xmlns:a16="http://schemas.microsoft.com/office/drawing/2014/main" id="{5D75E451-06D7-D878-0185-940E7A7C44B0}"/>
+              </a:ext>
+            </a:extLst>
+          </p:cNvPr>
+          <p:cNvSpPr>
+            <a:spLocks noGrp="1"/>
+          </p:cNvSpPr>
+          <p:nvPr>
+            <p:ph type="sldNum" sz="quarter" idx="12"/>
+          </p:nvPr>
+        </p:nvSpPr>
+        <p:spPr/>
+        <p:txBody>
+          <a:bodyPr/>
+          <a:lstStyle/>
+          <a:p>
+            <a:fld id="{8FE49E37-3F56-4533-A4C2-6E22C2CD2E23}" type="slidenum">
+              <a:rPr lang="LID4096" smtClean="0"/>
+              <a:t>7</a:t>
+            </a:fld>
+            <a:endParaRPr lang="LID4096"/>
+          </a:p>
+        </p:txBody>
+      </p:sp>
     </p:spTree>
     <p:extLst>
       <p:ext uri="{BB962C8B-B14F-4D97-AF65-F5344CB8AC3E}">
@@ -6058,15 +7832,18 @@
             <a:pPr lvl="2"/>
             <a:r>
               <a:rPr lang="en-US" dirty="0" err="1"/>
+              <a:t>CudaUVMSpace</a:t>
+            </a:r>
+            <a:r>
+              <a:rPr lang="en-US" dirty="0"/>
+              <a:t> </a:t>
+            </a:r>
+          </a:p>
+          <a:p>
+            <a:pPr lvl="2"/>
+            <a:r>
+              <a:rPr lang="en-US" dirty="0" err="1"/>
               <a:t>CudaSpace</a:t>
-            </a:r>
-            <a:endParaRPr lang="en-US" dirty="0"/>
-          </a:p>
-          <a:p>
-            <a:pPr lvl="2"/>
-            <a:r>
-              <a:rPr lang="en-US" dirty="0" err="1"/>
-              <a:t>CudaUVMSpace</a:t>
             </a:r>
             <a:endParaRPr lang="en-US" dirty="0"/>
           </a:p>
@@ -6119,6 +7896,13 @@
             <a:pPr lvl="2"/>
             <a:r>
               <a:rPr lang="en-US" dirty="0"/>
+              <a:t>SYCL</a:t>
+            </a:r>
+          </a:p>
+          <a:p>
+            <a:pPr lvl="2"/>
+            <a:r>
+              <a:rPr lang="en-US" dirty="0"/>
               <a:t>CUDA</a:t>
             </a:r>
           </a:p>
@@ -6129,12 +7913,657 @@
               <a:t>HIP</a:t>
             </a:r>
           </a:p>
-          <a:p>
-            <a:pPr lvl="2"/>
-            <a:r>
-              <a:rPr lang="en-US" dirty="0"/>
-              <a:t>SYCL</a:t>
-            </a:r>
+        </p:txBody>
+      </p:sp>
+      <p:grpSp>
+        <p:nvGrpSpPr>
+          <p:cNvPr id="9" name="Group 8">
+            <a:extLst>
+              <a:ext uri="{FF2B5EF4-FFF2-40B4-BE49-F238E27FC236}">
+                <a16:creationId xmlns:a16="http://schemas.microsoft.com/office/drawing/2014/main" id="{C0E8987B-1375-03E9-FB78-A8E523DD08EB}"/>
+              </a:ext>
+            </a:extLst>
+          </p:cNvPr>
+          <p:cNvGrpSpPr/>
+          <p:nvPr/>
+        </p:nvGrpSpPr>
+        <p:grpSpPr>
+          <a:xfrm>
+            <a:off x="5477256" y="2227564"/>
+            <a:ext cx="2349817" cy="835676"/>
+            <a:chOff x="5477256" y="2227564"/>
+            <a:chExt cx="2349817" cy="835676"/>
+          </a:xfrm>
+        </p:grpSpPr>
+        <p:sp>
+          <p:nvSpPr>
+            <p:cNvPr id="4" name="Right Brace 3">
+              <a:extLst>
+                <a:ext uri="{FF2B5EF4-FFF2-40B4-BE49-F238E27FC236}">
+                  <a16:creationId xmlns:a16="http://schemas.microsoft.com/office/drawing/2014/main" id="{2780A0DF-E537-FC75-A112-74E254FFE823}"/>
+                </a:ext>
+              </a:extLst>
+            </p:cNvPr>
+            <p:cNvSpPr/>
+            <p:nvPr/>
+          </p:nvSpPr>
+          <p:spPr>
+            <a:xfrm>
+              <a:off x="5477256" y="2569464"/>
+              <a:ext cx="164592" cy="493776"/>
+            </a:xfrm>
+            <a:prstGeom prst="rightBrace">
+              <a:avLst/>
+            </a:prstGeom>
+            <a:ln w="28575">
+              <a:solidFill>
+                <a:schemeClr val="tx1"/>
+              </a:solidFill>
+            </a:ln>
+          </p:spPr>
+          <p:style>
+            <a:lnRef idx="2">
+              <a:schemeClr val="accent1"/>
+            </a:lnRef>
+            <a:fillRef idx="0">
+              <a:schemeClr val="accent1"/>
+            </a:fillRef>
+            <a:effectRef idx="1">
+              <a:schemeClr val="accent1"/>
+            </a:effectRef>
+            <a:fontRef idx="minor">
+              <a:schemeClr val="tx1"/>
+            </a:fontRef>
+          </p:style>
+          <p:txBody>
+            <a:bodyPr rtlCol="0" anchor="ctr"/>
+            <a:lstStyle/>
+            <a:p>
+              <a:pPr algn="ctr"/>
+              <a:endParaRPr lang="en-US"/>
+            </a:p>
+          </p:txBody>
+        </p:sp>
+        <p:sp>
+          <p:nvSpPr>
+            <p:cNvPr id="5" name="TextBox 4">
+              <a:extLst>
+                <a:ext uri="{FF2B5EF4-FFF2-40B4-BE49-F238E27FC236}">
+                  <a16:creationId xmlns:a16="http://schemas.microsoft.com/office/drawing/2014/main" id="{6CFAC0E9-F00E-3377-7D60-F917B1B3B556}"/>
+                </a:ext>
+              </a:extLst>
+            </p:cNvPr>
+            <p:cNvSpPr txBox="1"/>
+            <p:nvPr/>
+          </p:nvSpPr>
+          <p:spPr>
+            <a:xfrm>
+              <a:off x="6638734" y="2227564"/>
+              <a:ext cx="1188339" cy="369332"/>
+            </a:xfrm>
+            <a:prstGeom prst="rect">
+              <a:avLst/>
+            </a:prstGeom>
+            <a:noFill/>
+            <a:ln>
+              <a:solidFill>
+                <a:schemeClr val="tx1"/>
+              </a:solidFill>
+            </a:ln>
+          </p:spPr>
+          <p:txBody>
+            <a:bodyPr wrap="none" rtlCol="0">
+              <a:spAutoFit/>
+            </a:bodyPr>
+            <a:lstStyle/>
+            <a:p>
+              <a:r>
+                <a:rPr lang="en-US" dirty="0"/>
+                <a:t>Host/CPU</a:t>
+              </a:r>
+            </a:p>
+          </p:txBody>
+        </p:sp>
+        <p:cxnSp>
+          <p:nvCxnSpPr>
+            <p:cNvPr id="7" name="Straight Arrow Connector 6">
+              <a:extLst>
+                <a:ext uri="{FF2B5EF4-FFF2-40B4-BE49-F238E27FC236}">
+                  <a16:creationId xmlns:a16="http://schemas.microsoft.com/office/drawing/2014/main" id="{9B2991DC-D9FC-D10C-79F3-CDA7F7C6FD0D}"/>
+                </a:ext>
+              </a:extLst>
+            </p:cNvPr>
+            <p:cNvCxnSpPr>
+              <a:stCxn id="5" idx="1"/>
+              <a:endCxn id="4" idx="1"/>
+            </p:cNvCxnSpPr>
+            <p:nvPr/>
+          </p:nvCxnSpPr>
+          <p:spPr>
+            <a:xfrm flipH="1">
+              <a:off x="5641848" y="2412230"/>
+              <a:ext cx="996886" cy="404122"/>
+            </a:xfrm>
+            <a:prstGeom prst="straightConnector1">
+              <a:avLst/>
+            </a:prstGeom>
+            <a:ln w="28575">
+              <a:solidFill>
+                <a:schemeClr val="tx1"/>
+              </a:solidFill>
+              <a:tailEnd type="none"/>
+            </a:ln>
+          </p:spPr>
+          <p:style>
+            <a:lnRef idx="2">
+              <a:schemeClr val="accent1"/>
+            </a:lnRef>
+            <a:fillRef idx="0">
+              <a:schemeClr val="accent1"/>
+            </a:fillRef>
+            <a:effectRef idx="1">
+              <a:schemeClr val="accent1"/>
+            </a:effectRef>
+            <a:fontRef idx="minor">
+              <a:schemeClr val="tx1"/>
+            </a:fontRef>
+          </p:style>
+        </p:cxnSp>
+      </p:grpSp>
+      <p:grpSp>
+        <p:nvGrpSpPr>
+          <p:cNvPr id="10" name="Group 9">
+            <a:extLst>
+              <a:ext uri="{FF2B5EF4-FFF2-40B4-BE49-F238E27FC236}">
+                <a16:creationId xmlns:a16="http://schemas.microsoft.com/office/drawing/2014/main" id="{052E2A7D-CEA4-2B9D-23AC-6AF32303A97B}"/>
+              </a:ext>
+            </a:extLst>
+          </p:cNvPr>
+          <p:cNvGrpSpPr/>
+          <p:nvPr/>
+        </p:nvGrpSpPr>
+        <p:grpSpPr>
+          <a:xfrm>
+            <a:off x="5463825" y="3784425"/>
+            <a:ext cx="2349817" cy="1443356"/>
+            <a:chOff x="5477256" y="2227564"/>
+            <a:chExt cx="2349817" cy="1443356"/>
+          </a:xfrm>
+        </p:grpSpPr>
+        <p:sp>
+          <p:nvSpPr>
+            <p:cNvPr id="11" name="Right Brace 10">
+              <a:extLst>
+                <a:ext uri="{FF2B5EF4-FFF2-40B4-BE49-F238E27FC236}">
+                  <a16:creationId xmlns:a16="http://schemas.microsoft.com/office/drawing/2014/main" id="{D5F82022-BBEB-478A-1D1F-A81036D53A00}"/>
+                </a:ext>
+              </a:extLst>
+            </p:cNvPr>
+            <p:cNvSpPr/>
+            <p:nvPr/>
+          </p:nvSpPr>
+          <p:spPr>
+            <a:xfrm>
+              <a:off x="5477256" y="2569463"/>
+              <a:ext cx="164592" cy="1101457"/>
+            </a:xfrm>
+            <a:prstGeom prst="rightBrace">
+              <a:avLst/>
+            </a:prstGeom>
+            <a:ln w="28575">
+              <a:solidFill>
+                <a:schemeClr val="tx1"/>
+              </a:solidFill>
+            </a:ln>
+          </p:spPr>
+          <p:style>
+            <a:lnRef idx="2">
+              <a:schemeClr val="accent1"/>
+            </a:lnRef>
+            <a:fillRef idx="0">
+              <a:schemeClr val="accent1"/>
+            </a:fillRef>
+            <a:effectRef idx="1">
+              <a:schemeClr val="accent1"/>
+            </a:effectRef>
+            <a:fontRef idx="minor">
+              <a:schemeClr val="tx1"/>
+            </a:fontRef>
+          </p:style>
+          <p:txBody>
+            <a:bodyPr rtlCol="0" anchor="ctr"/>
+            <a:lstStyle/>
+            <a:p>
+              <a:pPr algn="ctr"/>
+              <a:endParaRPr lang="en-US"/>
+            </a:p>
+          </p:txBody>
+        </p:sp>
+        <p:sp>
+          <p:nvSpPr>
+            <p:cNvPr id="12" name="TextBox 11">
+              <a:extLst>
+                <a:ext uri="{FF2B5EF4-FFF2-40B4-BE49-F238E27FC236}">
+                  <a16:creationId xmlns:a16="http://schemas.microsoft.com/office/drawing/2014/main" id="{468C56F4-3920-2D81-F949-2F334B9ECAAA}"/>
+                </a:ext>
+              </a:extLst>
+            </p:cNvPr>
+            <p:cNvSpPr txBox="1"/>
+            <p:nvPr/>
+          </p:nvSpPr>
+          <p:spPr>
+            <a:xfrm>
+              <a:off x="6638734" y="2227564"/>
+              <a:ext cx="1188339" cy="369332"/>
+            </a:xfrm>
+            <a:prstGeom prst="rect">
+              <a:avLst/>
+            </a:prstGeom>
+            <a:noFill/>
+            <a:ln>
+              <a:solidFill>
+                <a:schemeClr val="tx1"/>
+              </a:solidFill>
+            </a:ln>
+          </p:spPr>
+          <p:txBody>
+            <a:bodyPr wrap="none" rtlCol="0">
+              <a:spAutoFit/>
+            </a:bodyPr>
+            <a:lstStyle/>
+            <a:p>
+              <a:r>
+                <a:rPr lang="en-US" dirty="0"/>
+                <a:t>Host/CPU</a:t>
+              </a:r>
+            </a:p>
+          </p:txBody>
+        </p:sp>
+        <p:cxnSp>
+          <p:nvCxnSpPr>
+            <p:cNvPr id="13" name="Straight Arrow Connector 12">
+              <a:extLst>
+                <a:ext uri="{FF2B5EF4-FFF2-40B4-BE49-F238E27FC236}">
+                  <a16:creationId xmlns:a16="http://schemas.microsoft.com/office/drawing/2014/main" id="{33EA9B1D-FAE1-7EB4-D27B-4061C95BF4F6}"/>
+                </a:ext>
+              </a:extLst>
+            </p:cNvPr>
+            <p:cNvCxnSpPr>
+              <a:cxnSpLocks/>
+              <a:stCxn id="12" idx="1"/>
+              <a:endCxn id="11" idx="1"/>
+            </p:cNvCxnSpPr>
+            <p:nvPr/>
+          </p:nvCxnSpPr>
+          <p:spPr>
+            <a:xfrm flipH="1">
+              <a:off x="5641848" y="2412230"/>
+              <a:ext cx="996886" cy="707962"/>
+            </a:xfrm>
+            <a:prstGeom prst="straightConnector1">
+              <a:avLst/>
+            </a:prstGeom>
+            <a:ln w="28575">
+              <a:solidFill>
+                <a:schemeClr val="tx1"/>
+              </a:solidFill>
+              <a:tailEnd type="none"/>
+            </a:ln>
+          </p:spPr>
+          <p:style>
+            <a:lnRef idx="2">
+              <a:schemeClr val="accent1"/>
+            </a:lnRef>
+            <a:fillRef idx="0">
+              <a:schemeClr val="accent1"/>
+            </a:fillRef>
+            <a:effectRef idx="1">
+              <a:schemeClr val="accent1"/>
+            </a:effectRef>
+            <a:fontRef idx="minor">
+              <a:schemeClr val="tx1"/>
+            </a:fontRef>
+          </p:style>
+        </p:cxnSp>
+      </p:grpSp>
+      <p:grpSp>
+        <p:nvGrpSpPr>
+          <p:cNvPr id="15" name="Group 14">
+            <a:extLst>
+              <a:ext uri="{FF2B5EF4-FFF2-40B4-BE49-F238E27FC236}">
+                <a16:creationId xmlns:a16="http://schemas.microsoft.com/office/drawing/2014/main" id="{B522744B-A3C7-D318-4D91-5FD2B9DCA6C3}"/>
+              </a:ext>
+            </a:extLst>
+          </p:cNvPr>
+          <p:cNvGrpSpPr/>
+          <p:nvPr/>
+        </p:nvGrpSpPr>
+        <p:grpSpPr>
+          <a:xfrm>
+            <a:off x="5897511" y="4876478"/>
+            <a:ext cx="2020870" cy="868539"/>
+            <a:chOff x="5477256" y="2569463"/>
+            <a:chExt cx="2020870" cy="868539"/>
+          </a:xfrm>
+        </p:grpSpPr>
+        <p:sp>
+          <p:nvSpPr>
+            <p:cNvPr id="16" name="Right Brace 15">
+              <a:extLst>
+                <a:ext uri="{FF2B5EF4-FFF2-40B4-BE49-F238E27FC236}">
+                  <a16:creationId xmlns:a16="http://schemas.microsoft.com/office/drawing/2014/main" id="{966AA8B3-02F3-5163-5A0E-287D44E4252D}"/>
+                </a:ext>
+              </a:extLst>
+            </p:cNvPr>
+            <p:cNvSpPr/>
+            <p:nvPr/>
+          </p:nvSpPr>
+          <p:spPr>
+            <a:xfrm>
+              <a:off x="5477256" y="2569463"/>
+              <a:ext cx="164592" cy="868539"/>
+            </a:xfrm>
+            <a:prstGeom prst="rightBrace">
+              <a:avLst/>
+            </a:prstGeom>
+            <a:ln w="28575">
+              <a:solidFill>
+                <a:schemeClr val="tx1"/>
+              </a:solidFill>
+            </a:ln>
+          </p:spPr>
+          <p:style>
+            <a:lnRef idx="2">
+              <a:schemeClr val="accent1"/>
+            </a:lnRef>
+            <a:fillRef idx="0">
+              <a:schemeClr val="accent1"/>
+            </a:fillRef>
+            <a:effectRef idx="1">
+              <a:schemeClr val="accent1"/>
+            </a:effectRef>
+            <a:fontRef idx="minor">
+              <a:schemeClr val="tx1"/>
+            </a:fontRef>
+          </p:style>
+          <p:txBody>
+            <a:bodyPr rtlCol="0" anchor="ctr"/>
+            <a:lstStyle/>
+            <a:p>
+              <a:pPr algn="ctr"/>
+              <a:endParaRPr lang="en-US"/>
+            </a:p>
+          </p:txBody>
+        </p:sp>
+        <p:sp>
+          <p:nvSpPr>
+            <p:cNvPr id="17" name="TextBox 16">
+              <a:extLst>
+                <a:ext uri="{FF2B5EF4-FFF2-40B4-BE49-F238E27FC236}">
+                  <a16:creationId xmlns:a16="http://schemas.microsoft.com/office/drawing/2014/main" id="{3FC7E76A-C391-DE89-40F9-07269C6F90F6}"/>
+                </a:ext>
+              </a:extLst>
+            </p:cNvPr>
+            <p:cNvSpPr txBox="1"/>
+            <p:nvPr/>
+          </p:nvSpPr>
+          <p:spPr>
+            <a:xfrm>
+              <a:off x="6100307" y="2989647"/>
+              <a:ext cx="1397819" cy="369332"/>
+            </a:xfrm>
+            <a:prstGeom prst="rect">
+              <a:avLst/>
+            </a:prstGeom>
+            <a:noFill/>
+            <a:ln>
+              <a:solidFill>
+                <a:schemeClr val="tx1"/>
+              </a:solidFill>
+            </a:ln>
+          </p:spPr>
+          <p:txBody>
+            <a:bodyPr wrap="none" rtlCol="0">
+              <a:spAutoFit/>
+            </a:bodyPr>
+            <a:lstStyle/>
+            <a:p>
+              <a:r>
+                <a:rPr lang="en-US" dirty="0"/>
+                <a:t>Device/GPU</a:t>
+              </a:r>
+            </a:p>
+          </p:txBody>
+        </p:sp>
+        <p:cxnSp>
+          <p:nvCxnSpPr>
+            <p:cNvPr id="18" name="Straight Arrow Connector 17">
+              <a:extLst>
+                <a:ext uri="{FF2B5EF4-FFF2-40B4-BE49-F238E27FC236}">
+                  <a16:creationId xmlns:a16="http://schemas.microsoft.com/office/drawing/2014/main" id="{1DD6CF68-2FB9-46C1-2437-306A405D0213}"/>
+                </a:ext>
+              </a:extLst>
+            </p:cNvPr>
+            <p:cNvCxnSpPr>
+              <a:cxnSpLocks/>
+              <a:stCxn id="17" idx="1"/>
+              <a:endCxn id="16" idx="1"/>
+            </p:cNvCxnSpPr>
+            <p:nvPr/>
+          </p:nvCxnSpPr>
+          <p:spPr>
+            <a:xfrm flipH="1" flipV="1">
+              <a:off x="5641848" y="3003733"/>
+              <a:ext cx="458459" cy="170580"/>
+            </a:xfrm>
+            <a:prstGeom prst="straightConnector1">
+              <a:avLst/>
+            </a:prstGeom>
+            <a:ln w="28575">
+              <a:solidFill>
+                <a:schemeClr val="tx1"/>
+              </a:solidFill>
+              <a:tailEnd type="none"/>
+            </a:ln>
+          </p:spPr>
+          <p:style>
+            <a:lnRef idx="2">
+              <a:schemeClr val="accent1"/>
+            </a:lnRef>
+            <a:fillRef idx="0">
+              <a:schemeClr val="accent1"/>
+            </a:fillRef>
+            <a:effectRef idx="1">
+              <a:schemeClr val="accent1"/>
+            </a:effectRef>
+            <a:fontRef idx="minor">
+              <a:schemeClr val="tx1"/>
+            </a:fontRef>
+          </p:style>
+        </p:cxnSp>
+      </p:grpSp>
+      <p:grpSp>
+        <p:nvGrpSpPr>
+          <p:cNvPr id="21" name="Group 20">
+            <a:extLst>
+              <a:ext uri="{FF2B5EF4-FFF2-40B4-BE49-F238E27FC236}">
+                <a16:creationId xmlns:a16="http://schemas.microsoft.com/office/drawing/2014/main" id="{596B44AD-44FB-1776-521D-3173887E74C9}"/>
+              </a:ext>
+            </a:extLst>
+          </p:cNvPr>
+          <p:cNvGrpSpPr/>
+          <p:nvPr/>
+        </p:nvGrpSpPr>
+        <p:grpSpPr>
+          <a:xfrm>
+            <a:off x="5897511" y="2796321"/>
+            <a:ext cx="2020870" cy="868539"/>
+            <a:chOff x="5477256" y="2569463"/>
+            <a:chExt cx="2020870" cy="868539"/>
+          </a:xfrm>
+        </p:grpSpPr>
+        <p:sp>
+          <p:nvSpPr>
+            <p:cNvPr id="22" name="Right Brace 21">
+              <a:extLst>
+                <a:ext uri="{FF2B5EF4-FFF2-40B4-BE49-F238E27FC236}">
+                  <a16:creationId xmlns:a16="http://schemas.microsoft.com/office/drawing/2014/main" id="{DC2F89B8-6216-3222-6728-AB581CEAA875}"/>
+                </a:ext>
+              </a:extLst>
+            </p:cNvPr>
+            <p:cNvSpPr/>
+            <p:nvPr/>
+          </p:nvSpPr>
+          <p:spPr>
+            <a:xfrm>
+              <a:off x="5477256" y="2569463"/>
+              <a:ext cx="164592" cy="868539"/>
+            </a:xfrm>
+            <a:prstGeom prst="rightBrace">
+              <a:avLst/>
+            </a:prstGeom>
+            <a:ln w="28575">
+              <a:solidFill>
+                <a:schemeClr val="tx1"/>
+              </a:solidFill>
+            </a:ln>
+          </p:spPr>
+          <p:style>
+            <a:lnRef idx="2">
+              <a:schemeClr val="accent1"/>
+            </a:lnRef>
+            <a:fillRef idx="0">
+              <a:schemeClr val="accent1"/>
+            </a:fillRef>
+            <a:effectRef idx="1">
+              <a:schemeClr val="accent1"/>
+            </a:effectRef>
+            <a:fontRef idx="minor">
+              <a:schemeClr val="tx1"/>
+            </a:fontRef>
+          </p:style>
+          <p:txBody>
+            <a:bodyPr rtlCol="0" anchor="ctr"/>
+            <a:lstStyle/>
+            <a:p>
+              <a:pPr algn="ctr"/>
+              <a:endParaRPr lang="en-US"/>
+            </a:p>
+          </p:txBody>
+        </p:sp>
+        <p:sp>
+          <p:nvSpPr>
+            <p:cNvPr id="23" name="TextBox 22">
+              <a:extLst>
+                <a:ext uri="{FF2B5EF4-FFF2-40B4-BE49-F238E27FC236}">
+                  <a16:creationId xmlns:a16="http://schemas.microsoft.com/office/drawing/2014/main" id="{0AF5F4A7-E3C5-045D-BBE0-43B82BB30EAA}"/>
+                </a:ext>
+              </a:extLst>
+            </p:cNvPr>
+            <p:cNvSpPr txBox="1"/>
+            <p:nvPr/>
+          </p:nvSpPr>
+          <p:spPr>
+            <a:xfrm>
+              <a:off x="6100307" y="2989647"/>
+              <a:ext cx="1397819" cy="369332"/>
+            </a:xfrm>
+            <a:prstGeom prst="rect">
+              <a:avLst/>
+            </a:prstGeom>
+            <a:noFill/>
+            <a:ln>
+              <a:solidFill>
+                <a:schemeClr val="tx1"/>
+              </a:solidFill>
+            </a:ln>
+          </p:spPr>
+          <p:txBody>
+            <a:bodyPr wrap="none" rtlCol="0">
+              <a:spAutoFit/>
+            </a:bodyPr>
+            <a:lstStyle/>
+            <a:p>
+              <a:r>
+                <a:rPr lang="en-US" dirty="0"/>
+                <a:t>Device/GPU</a:t>
+              </a:r>
+            </a:p>
+          </p:txBody>
+        </p:sp>
+        <p:cxnSp>
+          <p:nvCxnSpPr>
+            <p:cNvPr id="24" name="Straight Arrow Connector 23">
+              <a:extLst>
+                <a:ext uri="{FF2B5EF4-FFF2-40B4-BE49-F238E27FC236}">
+                  <a16:creationId xmlns:a16="http://schemas.microsoft.com/office/drawing/2014/main" id="{791F2CB5-72D5-BFE3-19E5-8C72E1141BD9}"/>
+                </a:ext>
+              </a:extLst>
+            </p:cNvPr>
+            <p:cNvCxnSpPr>
+              <a:cxnSpLocks/>
+              <a:stCxn id="23" idx="1"/>
+              <a:endCxn id="22" idx="1"/>
+            </p:cNvCxnSpPr>
+            <p:nvPr/>
+          </p:nvCxnSpPr>
+          <p:spPr>
+            <a:xfrm flipH="1" flipV="1">
+              <a:off x="5641848" y="3003733"/>
+              <a:ext cx="458459" cy="170580"/>
+            </a:xfrm>
+            <a:prstGeom prst="straightConnector1">
+              <a:avLst/>
+            </a:prstGeom>
+            <a:ln w="28575">
+              <a:solidFill>
+                <a:schemeClr val="tx1"/>
+              </a:solidFill>
+              <a:tailEnd type="none"/>
+            </a:ln>
+          </p:spPr>
+          <p:style>
+            <a:lnRef idx="2">
+              <a:schemeClr val="accent1"/>
+            </a:lnRef>
+            <a:fillRef idx="0">
+              <a:schemeClr val="accent1"/>
+            </a:fillRef>
+            <a:effectRef idx="1">
+              <a:schemeClr val="accent1"/>
+            </a:effectRef>
+            <a:fontRef idx="minor">
+              <a:schemeClr val="tx1"/>
+            </a:fontRef>
+          </p:style>
+        </p:cxnSp>
+      </p:grpSp>
+      <p:sp>
+        <p:nvSpPr>
+          <p:cNvPr id="25" name="Slide Number Placeholder 24">
+            <a:extLst>
+              <a:ext uri="{FF2B5EF4-FFF2-40B4-BE49-F238E27FC236}">
+                <a16:creationId xmlns:a16="http://schemas.microsoft.com/office/drawing/2014/main" id="{799D91D9-BDC6-1C02-4D27-06EA661B871F}"/>
+              </a:ext>
+            </a:extLst>
+          </p:cNvPr>
+          <p:cNvSpPr>
+            <a:spLocks noGrp="1"/>
+          </p:cNvSpPr>
+          <p:nvPr>
+            <p:ph type="sldNum" sz="quarter" idx="12"/>
+          </p:nvPr>
+        </p:nvSpPr>
+        <p:spPr/>
+        <p:txBody>
+          <a:bodyPr/>
+          <a:lstStyle/>
+          <a:p>
+            <a:fld id="{8FE49E37-3F56-4533-A4C2-6E22C2CD2E23}" type="slidenum">
+              <a:rPr lang="LID4096" smtClean="0"/>
+              <a:t>8</a:t>
+            </a:fld>
+            <a:endParaRPr lang="LID4096"/>
           </a:p>
         </p:txBody>
       </p:sp>
@@ -6219,6 +8648,38 @@
           <a:lstStyle/>
           <a:p>
             <a:r>
+              <a:rPr lang="en-US" i="1" dirty="0"/>
+              <a:t>N</a:t>
+            </a:r>
+            <a:r>
+              <a:rPr lang="en-US" dirty="0"/>
+              <a:t>-dimensional arrays</a:t>
+            </a:r>
+          </a:p>
+          <a:p>
+            <a:pPr lvl="1"/>
+            <a:r>
+              <a:rPr lang="en-US" dirty="0"/>
+              <a:t>Basic types (double, float, int,…) and structs of basic types</a:t>
+            </a:r>
+          </a:p>
+          <a:p>
+            <a:pPr lvl="1"/>
+            <a:r>
+              <a:rPr lang="en-US" dirty="0"/>
+              <a:t>Can be const</a:t>
+            </a:r>
+          </a:p>
+          <a:p>
+            <a:pPr lvl="1"/>
+            <a:r>
+              <a:rPr lang="en-US" dirty="0"/>
+              <a:t>Can be resized</a:t>
+            </a:r>
+          </a:p>
+          <a:p>
+            <a:pPr lvl="1"/>
+            <a:r>
               <a:rPr lang="en-US" dirty="0"/>
               <a:t>Defined in memory space</a:t>
             </a:r>
@@ -6236,14 +8697,74 @@
               <a:rPr lang="en-US" dirty="0" err="1"/>
               <a:t>LayoutPolicy</a:t>
             </a:r>
+            <a:r>
+              <a:rPr lang="en-US" dirty="0"/>
+              <a:t>: </a:t>
+            </a:r>
+            <a:r>
+              <a:rPr lang="en-US" dirty="0" err="1"/>
+              <a:t>LayoutLeft</a:t>
+            </a:r>
+            <a:r>
+              <a:rPr lang="en-US" dirty="0"/>
+              <a:t> (CUDA), </a:t>
+            </a:r>
+            <a:r>
+              <a:rPr lang="en-US" dirty="0" err="1"/>
+              <a:t>LayoutRight</a:t>
+            </a:r>
+            <a:r>
+              <a:rPr lang="en-US" dirty="0"/>
+              <a:t> (CPU)</a:t>
+            </a:r>
+          </a:p>
+          <a:p>
+            <a:pPr lvl="1"/>
+            <a:r>
+              <a:rPr lang="en-US" dirty="0" err="1"/>
+              <a:t>AccessTraits</a:t>
+            </a:r>
+            <a:r>
+              <a:rPr lang="en-US" dirty="0"/>
+              <a:t>: Atomic, </a:t>
+            </a:r>
+            <a:r>
+              <a:rPr lang="en-US" dirty="0" err="1"/>
+              <a:t>RandomAccess</a:t>
+            </a:r>
             <a:endParaRPr lang="en-US" dirty="0"/>
           </a:p>
           <a:p>
             <a:pPr lvl="1"/>
-            <a:r>
-              <a:rPr lang="en-US"/>
-              <a:t>AccessPolicy</a:t>
-            </a:r>
+            <a:endParaRPr lang="LID4096" dirty="0"/>
+          </a:p>
+        </p:txBody>
+      </p:sp>
+      <p:sp>
+        <p:nvSpPr>
+          <p:cNvPr id="4" name="Slide Number Placeholder 3">
+            <a:extLst>
+              <a:ext uri="{FF2B5EF4-FFF2-40B4-BE49-F238E27FC236}">
+                <a16:creationId xmlns:a16="http://schemas.microsoft.com/office/drawing/2014/main" id="{7FB2477E-6F94-A417-E97F-BC29C0C3B39F}"/>
+              </a:ext>
+            </a:extLst>
+          </p:cNvPr>
+          <p:cNvSpPr>
+            <a:spLocks noGrp="1"/>
+          </p:cNvSpPr>
+          <p:nvPr>
+            <p:ph type="sldNum" sz="quarter" idx="12"/>
+          </p:nvPr>
+        </p:nvSpPr>
+        <p:spPr/>
+        <p:txBody>
+          <a:bodyPr/>
+          <a:lstStyle/>
+          <a:p>
+            <a:fld id="{8FE49E37-3F56-4533-A4C2-6E22C2CD2E23}" type="slidenum">
+              <a:rPr lang="LID4096" smtClean="0"/>
+              <a:t>9</a:t>
+            </a:fld>
             <a:endParaRPr lang="LID4096"/>
           </a:p>
         </p:txBody>
@@ -6574,4 +9095,319 @@
     </a:ext>
   </a:extLst>
 </a:theme>
+</file>
+
+<file path=ppt/theme/theme2.xml><?xml version="1.0" encoding="utf-8"?>
+<a:theme xmlns:a="http://schemas.openxmlformats.org/drawingml/2006/main" name="Office Theme">
+  <a:themeElements>
+    <a:clrScheme name="Office">
+      <a:dk1>
+        <a:sysClr val="windowText" lastClr="000000"/>
+      </a:dk1>
+      <a:lt1>
+        <a:sysClr val="window" lastClr="FFFFFF"/>
+      </a:lt1>
+      <a:dk2>
+        <a:srgbClr val="0E2841"/>
+      </a:dk2>
+      <a:lt2>
+        <a:srgbClr val="E8E8E8"/>
+      </a:lt2>
+      <a:accent1>
+        <a:srgbClr val="156082"/>
+      </a:accent1>
+      <a:accent2>
+        <a:srgbClr val="E97132"/>
+      </a:accent2>
+      <a:accent3>
+        <a:srgbClr val="196B24"/>
+      </a:accent3>
+      <a:accent4>
+        <a:srgbClr val="0F9ED5"/>
+      </a:accent4>
+      <a:accent5>
+        <a:srgbClr val="A02B93"/>
+      </a:accent5>
+      <a:accent6>
+        <a:srgbClr val="4EA72E"/>
+      </a:accent6>
+      <a:hlink>
+        <a:srgbClr val="467886"/>
+      </a:hlink>
+      <a:folHlink>
+        <a:srgbClr val="96607D"/>
+      </a:folHlink>
+    </a:clrScheme>
+    <a:fontScheme name="Office">
+      <a:majorFont>
+        <a:latin typeface="Aptos Display" panose="02110004020202020204"/>
+        <a:ea typeface=""/>
+        <a:cs typeface=""/>
+        <a:font script="Jpan" typeface="游ゴシック Light"/>
+        <a:font script="Hang" typeface="맑은 고딕"/>
+        <a:font script="Hans" typeface="等线 Light"/>
+        <a:font script="Hant" typeface="新細明體"/>
+        <a:font script="Arab" typeface="Times New Roman"/>
+        <a:font script="Hebr" typeface="Times New Roman"/>
+        <a:font script="Thai" typeface="Angsana New"/>
+        <a:font script="Ethi" typeface="Nyala"/>
+        <a:font script="Beng" typeface="Vrinda"/>
+        <a:font script="Gujr" typeface="Shruti"/>
+        <a:font script="Khmr" typeface="MoolBoran"/>
+        <a:font script="Knda" typeface="Tunga"/>
+        <a:font script="Guru" typeface="Raavi"/>
+        <a:font script="Cans" typeface="Euphemia"/>
+        <a:font script="Cher" typeface="Plantagenet Cherokee"/>
+        <a:font script="Yiii" typeface="Microsoft Yi Baiti"/>
+        <a:font script="Tibt" typeface="Microsoft Himalaya"/>
+        <a:font script="Thaa" typeface="MV Boli"/>
+        <a:font script="Deva" typeface="Mangal"/>
+        <a:font script="Telu" typeface="Gautami"/>
+        <a:font script="Taml" typeface="Latha"/>
+        <a:font script="Syrc" typeface="Estrangelo Edessa"/>
+        <a:font script="Orya" typeface="Kalinga"/>
+        <a:font script="Mlym" typeface="Kartika"/>
+        <a:font script="Laoo" typeface="DokChampa"/>
+        <a:font script="Sinh" typeface="Iskoola Pota"/>
+        <a:font script="Mong" typeface="Mongolian Baiti"/>
+        <a:font script="Viet" typeface="Times New Roman"/>
+        <a:font script="Uigh" typeface="Microsoft Uighur"/>
+        <a:font script="Geor" typeface="Sylfaen"/>
+        <a:font script="Armn" typeface="Arial"/>
+        <a:font script="Bugi" typeface="Leelawadee UI"/>
+        <a:font script="Bopo" typeface="Microsoft JhengHei"/>
+        <a:font script="Java" typeface="Javanese Text"/>
+        <a:font script="Lisu" typeface="Segoe UI"/>
+        <a:font script="Mymr" typeface="Myanmar Text"/>
+        <a:font script="Nkoo" typeface="Ebrima"/>
+        <a:font script="Olck" typeface="Nirmala UI"/>
+        <a:font script="Osma" typeface="Ebrima"/>
+        <a:font script="Phag" typeface="Phagspa"/>
+        <a:font script="Syrn" typeface="Estrangelo Edessa"/>
+        <a:font script="Syrj" typeface="Estrangelo Edessa"/>
+        <a:font script="Syre" typeface="Estrangelo Edessa"/>
+        <a:font script="Sora" typeface="Nirmala UI"/>
+        <a:font script="Tale" typeface="Microsoft Tai Le"/>
+        <a:font script="Talu" typeface="Microsoft New Tai Lue"/>
+        <a:font script="Tfng" typeface="Ebrima"/>
+      </a:majorFont>
+      <a:minorFont>
+        <a:latin typeface="Aptos" panose="02110004020202020204"/>
+        <a:ea typeface=""/>
+        <a:cs typeface=""/>
+        <a:font script="Jpan" typeface="游ゴシック"/>
+        <a:font script="Hang" typeface="맑은 고딕"/>
+        <a:font script="Hans" typeface="等线"/>
+        <a:font script="Hant" typeface="新細明體"/>
+        <a:font script="Arab" typeface="Arial"/>
+        <a:font script="Hebr" typeface="Arial"/>
+        <a:font script="Thai" typeface="Cordia New"/>
+        <a:font script="Ethi" typeface="Nyala"/>
+        <a:font script="Beng" typeface="Vrinda"/>
+        <a:font script="Gujr" typeface="Shruti"/>
+        <a:font script="Khmr" typeface="DaunPenh"/>
+        <a:font script="Knda" typeface="Tunga"/>
+        <a:font script="Guru" typeface="Raavi"/>
+        <a:font script="Cans" typeface="Euphemia"/>
+        <a:font script="Cher" typeface="Plantagenet Cherokee"/>
+        <a:font script="Yiii" typeface="Microsoft Yi Baiti"/>
+        <a:font script="Tibt" typeface="Microsoft Himalaya"/>
+        <a:font script="Thaa" typeface="MV Boli"/>
+        <a:font script="Deva" typeface="Mangal"/>
+        <a:font script="Telu" typeface="Gautami"/>
+        <a:font script="Taml" typeface="Latha"/>
+        <a:font script="Syrc" typeface="Estrangelo Edessa"/>
+        <a:font script="Orya" typeface="Kalinga"/>
+        <a:font script="Mlym" typeface="Kartika"/>
+        <a:font script="Laoo" typeface="DokChampa"/>
+        <a:font script="Sinh" typeface="Iskoola Pota"/>
+        <a:font script="Mong" typeface="Mongolian Baiti"/>
+        <a:font script="Viet" typeface="Arial"/>
+        <a:font script="Uigh" typeface="Microsoft Uighur"/>
+        <a:font script="Geor" typeface="Sylfaen"/>
+        <a:font script="Armn" typeface="Arial"/>
+        <a:font script="Bugi" typeface="Leelawadee UI"/>
+        <a:font script="Bopo" typeface="Microsoft JhengHei"/>
+        <a:font script="Java" typeface="Javanese Text"/>
+        <a:font script="Lisu" typeface="Segoe UI"/>
+        <a:font script="Mymr" typeface="Myanmar Text"/>
+        <a:font script="Nkoo" typeface="Ebrima"/>
+        <a:font script="Olck" typeface="Nirmala UI"/>
+        <a:font script="Osma" typeface="Ebrima"/>
+        <a:font script="Phag" typeface="Phagspa"/>
+        <a:font script="Syrn" typeface="Estrangelo Edessa"/>
+        <a:font script="Syrj" typeface="Estrangelo Edessa"/>
+        <a:font script="Syre" typeface="Estrangelo Edessa"/>
+        <a:font script="Sora" typeface="Nirmala UI"/>
+        <a:font script="Tale" typeface="Microsoft Tai Le"/>
+        <a:font script="Talu" typeface="Microsoft New Tai Lue"/>
+        <a:font script="Tfng" typeface="Ebrima"/>
+      </a:minorFont>
+    </a:fontScheme>
+    <a:fmtScheme name="Office">
+      <a:fillStyleLst>
+        <a:solidFill>
+          <a:schemeClr val="phClr"/>
+        </a:solidFill>
+        <a:gradFill rotWithShape="1">
+          <a:gsLst>
+            <a:gs pos="0">
+              <a:schemeClr val="phClr">
+                <a:lumMod val="110000"/>
+                <a:satMod val="105000"/>
+                <a:tint val="67000"/>
+              </a:schemeClr>
+            </a:gs>
+            <a:gs pos="50000">
+              <a:schemeClr val="phClr">
+                <a:lumMod val="105000"/>
+                <a:satMod val="103000"/>
+                <a:tint val="73000"/>
+              </a:schemeClr>
+            </a:gs>
+            <a:gs pos="100000">
+              <a:schemeClr val="phClr">
+                <a:lumMod val="105000"/>
+                <a:satMod val="109000"/>
+                <a:tint val="81000"/>
+              </a:schemeClr>
+            </a:gs>
+          </a:gsLst>
+          <a:lin ang="5400000" scaled="0"/>
+        </a:gradFill>
+        <a:gradFill rotWithShape="1">
+          <a:gsLst>
+            <a:gs pos="0">
+              <a:schemeClr val="phClr">
+                <a:satMod val="103000"/>
+                <a:lumMod val="102000"/>
+                <a:tint val="94000"/>
+              </a:schemeClr>
+            </a:gs>
+            <a:gs pos="50000">
+              <a:schemeClr val="phClr">
+                <a:satMod val="110000"/>
+                <a:lumMod val="100000"/>
+                <a:shade val="100000"/>
+              </a:schemeClr>
+            </a:gs>
+            <a:gs pos="100000">
+              <a:schemeClr val="phClr">
+                <a:lumMod val="99000"/>
+                <a:satMod val="120000"/>
+                <a:shade val="78000"/>
+              </a:schemeClr>
+            </a:gs>
+          </a:gsLst>
+          <a:lin ang="5400000" scaled="0"/>
+        </a:gradFill>
+      </a:fillStyleLst>
+      <a:lnStyleLst>
+        <a:ln w="12700" cap="flat" cmpd="sng" algn="ctr">
+          <a:solidFill>
+            <a:schemeClr val="phClr"/>
+          </a:solidFill>
+          <a:prstDash val="solid"/>
+          <a:miter lim="800000"/>
+        </a:ln>
+        <a:ln w="19050" cap="flat" cmpd="sng" algn="ctr">
+          <a:solidFill>
+            <a:schemeClr val="phClr"/>
+          </a:solidFill>
+          <a:prstDash val="solid"/>
+          <a:miter lim="800000"/>
+        </a:ln>
+        <a:ln w="25400" cap="flat" cmpd="sng" algn="ctr">
+          <a:solidFill>
+            <a:schemeClr val="phClr"/>
+          </a:solidFill>
+          <a:prstDash val="solid"/>
+          <a:miter lim="800000"/>
+        </a:ln>
+      </a:lnStyleLst>
+      <a:effectStyleLst>
+        <a:effectStyle>
+          <a:effectLst/>
+        </a:effectStyle>
+        <a:effectStyle>
+          <a:effectLst/>
+        </a:effectStyle>
+        <a:effectStyle>
+          <a:effectLst>
+            <a:outerShdw blurRad="57150" dist="19050" dir="5400000" algn="ctr" rotWithShape="0">
+              <a:srgbClr val="000000">
+                <a:alpha val="63000"/>
+              </a:srgbClr>
+            </a:outerShdw>
+          </a:effectLst>
+        </a:effectStyle>
+      </a:effectStyleLst>
+      <a:bgFillStyleLst>
+        <a:solidFill>
+          <a:schemeClr val="phClr"/>
+        </a:solidFill>
+        <a:solidFill>
+          <a:schemeClr val="phClr">
+            <a:tint val="95000"/>
+            <a:satMod val="170000"/>
+          </a:schemeClr>
+        </a:solidFill>
+        <a:gradFill rotWithShape="1">
+          <a:gsLst>
+            <a:gs pos="0">
+              <a:schemeClr val="phClr">
+                <a:tint val="93000"/>
+                <a:satMod val="150000"/>
+                <a:shade val="98000"/>
+                <a:lumMod val="102000"/>
+              </a:schemeClr>
+            </a:gs>
+            <a:gs pos="50000">
+              <a:schemeClr val="phClr">
+                <a:tint val="98000"/>
+                <a:satMod val="130000"/>
+                <a:shade val="90000"/>
+                <a:lumMod val="103000"/>
+              </a:schemeClr>
+            </a:gs>
+            <a:gs pos="100000">
+              <a:schemeClr val="phClr">
+                <a:shade val="63000"/>
+                <a:satMod val="120000"/>
+              </a:schemeClr>
+            </a:gs>
+          </a:gsLst>
+          <a:lin ang="5400000" scaled="0"/>
+        </a:gradFill>
+      </a:bgFillStyleLst>
+    </a:fmtScheme>
+  </a:themeElements>
+  <a:objectDefaults>
+    <a:lnDef>
+      <a:spPr/>
+      <a:bodyPr/>
+      <a:lstStyle/>
+      <a:style>
+        <a:lnRef idx="2">
+          <a:schemeClr val="accent1"/>
+        </a:lnRef>
+        <a:fillRef idx="0">
+          <a:schemeClr val="accent1"/>
+        </a:fillRef>
+        <a:effectRef idx="1">
+          <a:schemeClr val="accent1"/>
+        </a:effectRef>
+        <a:fontRef idx="minor">
+          <a:schemeClr val="tx1"/>
+        </a:fontRef>
+      </a:style>
+    </a:lnDef>
+  </a:objectDefaults>
+  <a:extraClrSchemeLst/>
+  <a:extLst>
+    <a:ext uri="{05A4C25C-085E-4340-85A3-A5531E510DB2}">
+      <thm15:themeFamily xmlns:thm15="http://schemas.microsoft.com/office/thememl/2012/main" name="Office Theme" id="{2E142A2C-CD16-42D6-873A-C26D2A0506FA}" vid="{1BDDFF52-6CD6-40A5-AB3C-68EB2F1E4D0A}"/>
+    </a:ext>
+  </a:extLst>
+</a:theme>
 </file>
</xml_diff>